<commit_message>
update apresentação e errata
</commit_message>
<xml_diff>
--- a/Apresentação/Estudo e Implementação de Reconfiguração Dinâmica.pptx
+++ b/Apresentação/Estudo e Implementação de Reconfiguração Dinâmica.pptx
@@ -5,10 +5,10 @@
     <p:sldMasterId id="2147483648" r:id="rId1"/>
   </p:sldMasterIdLst>
   <p:notesMasterIdLst>
-    <p:notesMasterId r:id="rId41"/>
+    <p:notesMasterId r:id="rId42"/>
   </p:notesMasterIdLst>
   <p:handoutMasterIdLst>
-    <p:handoutMasterId r:id="rId42"/>
+    <p:handoutMasterId r:id="rId43"/>
   </p:handoutMasterIdLst>
   <p:sldIdLst>
     <p:sldId id="256" r:id="rId2"/>
@@ -26,30 +26,31 @@
     <p:sldId id="279" r:id="rId14"/>
     <p:sldId id="280" r:id="rId15"/>
     <p:sldId id="283" r:id="rId16"/>
-    <p:sldId id="281" r:id="rId17"/>
-    <p:sldId id="260" r:id="rId18"/>
-    <p:sldId id="261" r:id="rId19"/>
-    <p:sldId id="284" r:id="rId20"/>
-    <p:sldId id="262" r:id="rId21"/>
-    <p:sldId id="263" r:id="rId22"/>
-    <p:sldId id="285" r:id="rId23"/>
-    <p:sldId id="286" r:id="rId24"/>
-    <p:sldId id="264" r:id="rId25"/>
-    <p:sldId id="265" r:id="rId26"/>
-    <p:sldId id="287" r:id="rId27"/>
-    <p:sldId id="288" r:id="rId28"/>
-    <p:sldId id="289" r:id="rId29"/>
-    <p:sldId id="266" r:id="rId30"/>
-    <p:sldId id="267" r:id="rId31"/>
-    <p:sldId id="290" r:id="rId32"/>
-    <p:sldId id="268" r:id="rId33"/>
-    <p:sldId id="269" r:id="rId34"/>
-    <p:sldId id="291" r:id="rId35"/>
-    <p:sldId id="271" r:id="rId36"/>
-    <p:sldId id="292" r:id="rId37"/>
-    <p:sldId id="270" r:id="rId38"/>
-    <p:sldId id="272" r:id="rId39"/>
-    <p:sldId id="295" r:id="rId40"/>
+    <p:sldId id="296" r:id="rId17"/>
+    <p:sldId id="281" r:id="rId18"/>
+    <p:sldId id="260" r:id="rId19"/>
+    <p:sldId id="261" r:id="rId20"/>
+    <p:sldId id="284" r:id="rId21"/>
+    <p:sldId id="262" r:id="rId22"/>
+    <p:sldId id="263" r:id="rId23"/>
+    <p:sldId id="285" r:id="rId24"/>
+    <p:sldId id="286" r:id="rId25"/>
+    <p:sldId id="264" r:id="rId26"/>
+    <p:sldId id="265" r:id="rId27"/>
+    <p:sldId id="287" r:id="rId28"/>
+    <p:sldId id="288" r:id="rId29"/>
+    <p:sldId id="289" r:id="rId30"/>
+    <p:sldId id="266" r:id="rId31"/>
+    <p:sldId id="267" r:id="rId32"/>
+    <p:sldId id="290" r:id="rId33"/>
+    <p:sldId id="268" r:id="rId34"/>
+    <p:sldId id="269" r:id="rId35"/>
+    <p:sldId id="291" r:id="rId36"/>
+    <p:sldId id="271" r:id="rId37"/>
+    <p:sldId id="292" r:id="rId38"/>
+    <p:sldId id="270" r:id="rId39"/>
+    <p:sldId id="272" r:id="rId40"/>
+    <p:sldId id="295" r:id="rId41"/>
   </p:sldIdLst>
   <p:sldSz cx="9144000" cy="6858000" type="screen4x3"/>
   <p:notesSz cx="6670675" cy="9802813"/>
@@ -184,6 +185,7 @@
             <p14:sldId id="279"/>
             <p14:sldId id="280"/>
             <p14:sldId id="283"/>
+            <p14:sldId id="296"/>
           </p14:sldIdLst>
         </p14:section>
         <p14:section name="Exp1" id="{44507A58-BA51-4172-B6A7-5CEEA16B79D2}">
@@ -9611,7 +9613,7 @@
       </p:grpSpPr>
       <p:sp>
         <p:nvSpPr>
-          <p:cNvPr id="7" name="Título 6"/>
+          <p:cNvPr id="2" name="Título 1"/>
           <p:cNvSpPr>
             <a:spLocks noGrp="1"/>
           </p:cNvSpPr>
@@ -9626,7 +9628,7 @@
           <a:p>
             <a:r>
               <a:rPr lang="pt-BR" dirty="0" smtClean="0"/>
-              <a:t>Reconfiguração dinâmica</a:t>
+              <a:t>ICAP</a:t>
             </a:r>
             <a:endParaRPr lang="pt-BR" dirty="0"/>
           </a:p>
@@ -9634,12 +9636,12 @@
       </p:sp>
       <p:sp>
         <p:nvSpPr>
-          <p:cNvPr id="8" name="Espaço Reservado para Texto 7"/>
-          <p:cNvSpPr>
-            <a:spLocks noGrp="1"/>
-          </p:cNvSpPr>
-          <p:nvPr>
-            <p:ph type="body" idx="1"/>
+          <p:cNvPr id="3" name="Espaço Reservado para Conteúdo 2"/>
+          <p:cNvSpPr>
+            <a:spLocks noGrp="1"/>
+          </p:cNvSpPr>
+          <p:nvPr>
+            <p:ph sz="half" idx="1"/>
           </p:nvPr>
         </p:nvSpPr>
         <p:spPr/>
@@ -9649,15 +9651,57 @@
           <a:p>
             <a:r>
               <a:rPr lang="pt-BR" dirty="0" smtClean="0"/>
-              <a:t>Experimento 1</a:t>
-            </a:r>
+              <a:t>3 páginas de documentação</a:t>
+            </a:r>
+          </a:p>
+          <a:p>
+            <a:r>
+              <a:rPr lang="pt-BR" dirty="0" smtClean="0"/>
+              <a:t>Similar a </a:t>
+            </a:r>
+            <a:r>
+              <a:rPr lang="pt-BR" i="1" dirty="0" err="1" smtClean="0"/>
+              <a:t>SelectMAP</a:t>
+            </a:r>
+            <a:endParaRPr lang="pt-BR" i="1" dirty="0" smtClean="0"/>
+          </a:p>
+          <a:p>
             <a:endParaRPr lang="pt-BR" dirty="0"/>
           </a:p>
         </p:txBody>
       </p:sp>
-      <p:sp>
-        <p:nvSpPr>
-          <p:cNvPr id="4" name="Espaço Reservado para Data 3"/>
+      <p:pic>
+        <p:nvPicPr>
+          <p:cNvPr id="8" name="Espaço Reservado para Conteúdo 7"/>
+          <p:cNvPicPr>
+            <a:picLocks noGrp="1" noChangeAspect="1"/>
+          </p:cNvPicPr>
+          <p:nvPr>
+            <p:ph sz="half" idx="2"/>
+          </p:nvPr>
+        </p:nvPicPr>
+        <p:blipFill>
+          <a:blip r:embed="rId2">
+            <a:extLst>
+              <a:ext uri="{28A0092B-C50C-407E-A947-70E740481C1C}">
+                <a14:useLocalDpi xmlns:a14="http://schemas.microsoft.com/office/drawing/2010/main" val="0"/>
+              </a:ext>
+            </a:extLst>
+          </a:blip>
+          <a:stretch>
+            <a:fillRect/>
+          </a:stretch>
+        </p:blipFill>
+        <p:spPr>
+          <a:xfrm>
+            <a:off x="4648200" y="2132856"/>
+            <a:ext cx="4038600" cy="1849535"/>
+          </a:xfrm>
+        </p:spPr>
+      </p:pic>
+      <p:sp>
+        <p:nvSpPr>
+          <p:cNvPr id="5" name="Espaço Reservado para Data 4"/>
           <p:cNvSpPr>
             <a:spLocks noGrp="1"/>
           </p:cNvSpPr>
@@ -9680,7 +9724,7 @@
       </p:sp>
       <p:sp>
         <p:nvSpPr>
-          <p:cNvPr id="5" name="Espaço Reservado para Rodapé 4"/>
+          <p:cNvPr id="6" name="Espaço Reservado para Rodapé 5"/>
           <p:cNvSpPr>
             <a:spLocks noGrp="1"/>
           </p:cNvSpPr>
@@ -9693,13 +9737,17 @@
           <a:bodyPr/>
           <a:lstStyle/>
           <a:p>
-            <a:endParaRPr lang="pt-BR"/>
-          </a:p>
-        </p:txBody>
-      </p:sp>
-      <p:sp>
-        <p:nvSpPr>
-          <p:cNvPr id="6" name="Espaço Reservado para Número de Slide 5"/>
+            <a:r>
+              <a:rPr lang="pt-BR" dirty="0" smtClean="0"/>
+              <a:t>Experimentos</a:t>
+            </a:r>
+            <a:endParaRPr lang="pt-BR" dirty="0"/>
+          </a:p>
+        </p:txBody>
+      </p:sp>
+      <p:sp>
+        <p:nvSpPr>
+          <p:cNvPr id="7" name="Espaço Reservado para Número de Slide 6"/>
           <p:cNvSpPr>
             <a:spLocks noGrp="1"/>
           </p:cNvSpPr>
@@ -9723,20 +9771,13 @@
     </p:spTree>
     <p:extLst>
       <p:ext uri="{BB962C8B-B14F-4D97-AF65-F5344CB8AC3E}">
-        <p14:creationId xmlns:p14="http://schemas.microsoft.com/office/powerpoint/2010/main" val="4232592810"/>
+        <p14:creationId xmlns:p14="http://schemas.microsoft.com/office/powerpoint/2010/main" val="3563127477"/>
       </p:ext>
     </p:extLst>
   </p:cSld>
   <p:clrMapOvr>
     <a:masterClrMapping/>
   </p:clrMapOvr>
-  <p:timing>
-    <p:tnLst>
-      <p:par>
-        <p:cTn id="1" dur="indefinite" restart="never" nodeType="tmRoot"/>
-      </p:par>
-    </p:tnLst>
-  </p:timing>
 </p:sld>
 </file>
 
@@ -9759,7 +9800,7 @@
       </p:grpSpPr>
       <p:sp>
         <p:nvSpPr>
-          <p:cNvPr id="14" name="Título 13"/>
+          <p:cNvPr id="7" name="Título 6"/>
           <p:cNvSpPr>
             <a:spLocks noGrp="1"/>
           </p:cNvSpPr>
@@ -9774,70 +9815,35 @@
           <a:p>
             <a:r>
               <a:rPr lang="pt-BR" dirty="0" smtClean="0"/>
-              <a:t>Fluxo de Projeto</a:t>
+              <a:t>Reconfiguração dinâmica</a:t>
             </a:r>
             <a:endParaRPr lang="pt-BR" dirty="0"/>
           </a:p>
         </p:txBody>
       </p:sp>
-      <p:pic>
-        <p:nvPicPr>
-          <p:cNvPr id="12" name="Espaço Reservado para Conteúdo 11"/>
-          <p:cNvPicPr>
-            <a:picLocks noGrp="1" noChangeAspect="1"/>
-          </p:cNvPicPr>
-          <p:nvPr>
-            <p:ph sz="half" idx="1"/>
-          </p:nvPr>
-        </p:nvPicPr>
-        <p:blipFill>
-          <a:blip r:embed="rId3" cstate="print">
-            <a:extLst>
-              <a:ext uri="{28A0092B-C50C-407E-A947-70E740481C1C}">
-                <a14:useLocalDpi xmlns:a14="http://schemas.microsoft.com/office/drawing/2010/main" val="0"/>
-              </a:ext>
-            </a:extLst>
-          </a:blip>
-          <a:stretch>
-            <a:fillRect/>
-          </a:stretch>
-        </p:blipFill>
-        <p:spPr>
-          <a:xfrm>
-            <a:off x="457200" y="1844824"/>
-            <a:ext cx="8229600" cy="1837265"/>
-          </a:xfrm>
-        </p:spPr>
-      </p:pic>
-      <p:pic>
-        <p:nvPicPr>
-          <p:cNvPr id="13" name="Espaço Reservado para Conteúdo 12"/>
-          <p:cNvPicPr>
-            <a:picLocks noGrp="1" noChangeAspect="1"/>
-          </p:cNvPicPr>
-          <p:nvPr>
-            <p:ph sz="half" idx="2"/>
-          </p:nvPr>
-        </p:nvPicPr>
-        <p:blipFill>
-          <a:blip r:embed="rId4" cstate="print">
-            <a:extLst>
-              <a:ext uri="{28A0092B-C50C-407E-A947-70E740481C1C}">
-                <a14:useLocalDpi xmlns:a14="http://schemas.microsoft.com/office/drawing/2010/main" val="0"/>
-              </a:ext>
-            </a:extLst>
-          </a:blip>
-          <a:stretch>
-            <a:fillRect/>
-          </a:stretch>
-        </p:blipFill>
-        <p:spPr>
-          <a:xfrm>
-            <a:off x="457200" y="3969888"/>
-            <a:ext cx="8229600" cy="1835376"/>
-          </a:xfrm>
-        </p:spPr>
-      </p:pic>
+      <p:sp>
+        <p:nvSpPr>
+          <p:cNvPr id="8" name="Espaço Reservado para Texto 7"/>
+          <p:cNvSpPr>
+            <a:spLocks noGrp="1"/>
+          </p:cNvSpPr>
+          <p:nvPr>
+            <p:ph type="body" idx="1"/>
+          </p:nvPr>
+        </p:nvSpPr>
+        <p:spPr/>
+        <p:txBody>
+          <a:bodyPr/>
+          <a:lstStyle/>
+          <a:p>
+            <a:r>
+              <a:rPr lang="pt-BR" dirty="0" smtClean="0"/>
+              <a:t>Experimento 1</a:t>
+            </a:r>
+            <a:endParaRPr lang="pt-BR" dirty="0"/>
+          </a:p>
+        </p:txBody>
+      </p:sp>
       <p:sp>
         <p:nvSpPr>
           <p:cNvPr id="4" name="Espaço Reservado para Data 3"/>
@@ -9876,10 +9882,7 @@
           <a:bodyPr/>
           <a:lstStyle/>
           <a:p>
-            <a:r>
-              <a:rPr lang="pt-BR" dirty="0"/>
-              <a:t>Experimento 1</a:t>
-            </a:r>
+            <a:endParaRPr lang="pt-BR"/>
           </a:p>
         </p:txBody>
       </p:sp>
@@ -9909,7 +9912,7 @@
     </p:spTree>
     <p:extLst>
       <p:ext uri="{BB962C8B-B14F-4D97-AF65-F5344CB8AC3E}">
-        <p14:creationId xmlns:p14="http://schemas.microsoft.com/office/powerpoint/2010/main" val="2541514933"/>
+        <p14:creationId xmlns:p14="http://schemas.microsoft.com/office/powerpoint/2010/main" val="4232592810"/>
       </p:ext>
     </p:extLst>
   </p:cSld>
@@ -9945,7 +9948,7 @@
       </p:grpSpPr>
       <p:sp>
         <p:nvSpPr>
-          <p:cNvPr id="2" name="Título 1"/>
+          <p:cNvPr id="14" name="Título 13"/>
           <p:cNvSpPr>
             <a:spLocks noGrp="1"/>
           </p:cNvSpPr>
@@ -9960,7 +9963,7 @@
           <a:p>
             <a:r>
               <a:rPr lang="pt-BR" dirty="0" smtClean="0"/>
-              <a:t>Comportamento</a:t>
+              <a:t>Fluxo de Projeto</a:t>
             </a:r>
             <a:endParaRPr lang="pt-BR" dirty="0"/>
           </a:p>
@@ -9968,16 +9971,16 @@
       </p:sp>
       <p:pic>
         <p:nvPicPr>
-          <p:cNvPr id="7" name="Espaço Reservado para Conteúdo 6"/>
+          <p:cNvPr id="12" name="Espaço Reservado para Conteúdo 11"/>
           <p:cNvPicPr>
             <a:picLocks noGrp="1" noChangeAspect="1"/>
           </p:cNvPicPr>
           <p:nvPr>
-            <p:ph idx="1"/>
+            <p:ph sz="half" idx="1"/>
           </p:nvPr>
         </p:nvPicPr>
         <p:blipFill>
-          <a:blip r:embed="rId3">
+          <a:blip r:embed="rId3" cstate="print">
             <a:extLst>
               <a:ext uri="{28A0092B-C50C-407E-A947-70E740481C1C}">
                 <a14:useLocalDpi xmlns:a14="http://schemas.microsoft.com/office/drawing/2010/main" val="0"/>
@@ -9990,11 +9993,40 @@
         </p:blipFill>
         <p:spPr>
           <a:xfrm>
-            <a:off x="2514600" y="2125980"/>
-            <a:ext cx="4114800" cy="2606040"/>
+            <a:off x="457200" y="1844824"/>
+            <a:ext cx="8229600" cy="1837265"/>
           </a:xfrm>
         </p:spPr>
       </p:pic>
+      <p:pic>
+        <p:nvPicPr>
+          <p:cNvPr id="13" name="Espaço Reservado para Conteúdo 12"/>
+          <p:cNvPicPr>
+            <a:picLocks noGrp="1" noChangeAspect="1"/>
+          </p:cNvPicPr>
+          <p:nvPr>
+            <p:ph sz="half" idx="2"/>
+          </p:nvPr>
+        </p:nvPicPr>
+        <p:blipFill>
+          <a:blip r:embed="rId4" cstate="print">
+            <a:extLst>
+              <a:ext uri="{28A0092B-C50C-407E-A947-70E740481C1C}">
+                <a14:useLocalDpi xmlns:a14="http://schemas.microsoft.com/office/drawing/2010/main" val="0"/>
+              </a:ext>
+            </a:extLst>
+          </a:blip>
+          <a:stretch>
+            <a:fillRect/>
+          </a:stretch>
+        </p:blipFill>
+        <p:spPr>
+          <a:xfrm>
+            <a:off x="457200" y="3969888"/>
+            <a:ext cx="8229600" cy="1835376"/>
+          </a:xfrm>
+        </p:spPr>
+      </p:pic>
       <p:sp>
         <p:nvSpPr>
           <p:cNvPr id="4" name="Espaço Reservado para Data 3"/>
@@ -10035,13 +10067,8 @@
           <a:p>
             <a:r>
               <a:rPr lang="pt-BR" dirty="0"/>
-              <a:t>Experimento </a:t>
-            </a:r>
-            <a:r>
-              <a:rPr lang="pt-BR" dirty="0" smtClean="0"/>
-              <a:t>1</a:t>
-            </a:r>
-            <a:endParaRPr lang="pt-BR" dirty="0"/>
+              <a:t>Experimento 1</a:t>
+            </a:r>
           </a:p>
         </p:txBody>
       </p:sp>
@@ -10071,7 +10098,7 @@
     </p:spTree>
     <p:extLst>
       <p:ext uri="{BB962C8B-B14F-4D97-AF65-F5344CB8AC3E}">
-        <p14:creationId xmlns:p14="http://schemas.microsoft.com/office/powerpoint/2010/main" val="1010192082"/>
+        <p14:creationId xmlns:p14="http://schemas.microsoft.com/office/powerpoint/2010/main" val="2541514933"/>
       </p:ext>
     </p:extLst>
   </p:cSld>
@@ -10122,38 +10149,7 @@
           <a:p>
             <a:r>
               <a:rPr lang="pt-BR" dirty="0" smtClean="0"/>
-              <a:t>Resultado</a:t>
-            </a:r>
-            <a:endParaRPr lang="pt-BR" dirty="0"/>
-          </a:p>
-        </p:txBody>
-      </p:sp>
-      <p:sp>
-        <p:nvSpPr>
-          <p:cNvPr id="13" name="Espaço Reservado para Conteúdo 12"/>
-          <p:cNvSpPr>
-            <a:spLocks noGrp="1"/>
-          </p:cNvSpPr>
-          <p:nvPr>
-            <p:ph sz="half" idx="1"/>
-          </p:nvPr>
-        </p:nvSpPr>
-        <p:spPr>
-          <a:xfrm>
-            <a:off x="457200" y="1600200"/>
-            <a:ext cx="4834880" cy="4525963"/>
-          </a:xfrm>
-        </p:spPr>
-        <p:txBody>
-          <a:bodyPr/>
-          <a:lstStyle/>
-          <a:p>
-            <a:pPr marL="0" indent="0">
-              <a:buNone/>
-            </a:pPr>
-            <a:r>
-              <a:rPr lang="pt-BR" dirty="0" smtClean="0"/>
-              <a:t>Experimento bem sucedido</a:t>
+              <a:t>Comportamento</a:t>
             </a:r>
             <a:endParaRPr lang="pt-BR" dirty="0"/>
           </a:p>
@@ -10161,16 +10157,16 @@
       </p:sp>
       <p:pic>
         <p:nvPicPr>
-          <p:cNvPr id="15" name="Espaço Reservado para Conteúdo 14"/>
+          <p:cNvPr id="7" name="Espaço Reservado para Conteúdo 6"/>
           <p:cNvPicPr>
             <a:picLocks noGrp="1" noChangeAspect="1"/>
           </p:cNvPicPr>
           <p:nvPr>
-            <p:ph sz="half" idx="2"/>
+            <p:ph idx="1"/>
           </p:nvPr>
         </p:nvPicPr>
         <p:blipFill>
-          <a:blip r:embed="rId3" cstate="print">
+          <a:blip r:embed="rId3">
             <a:extLst>
               <a:ext uri="{28A0092B-C50C-407E-A947-70E740481C1C}">
                 <a14:useLocalDpi xmlns:a14="http://schemas.microsoft.com/office/drawing/2010/main" val="0"/>
@@ -10183,8 +10179,8 @@
         </p:blipFill>
         <p:spPr>
           <a:xfrm>
-            <a:off x="5378557" y="1600200"/>
-            <a:ext cx="2577886" cy="4525963"/>
+            <a:off x="2514600" y="2125980"/>
+            <a:ext cx="4114800" cy="2606040"/>
           </a:xfrm>
         </p:spPr>
       </p:pic>
@@ -10227,8 +10223,12 @@
           <a:lstStyle/>
           <a:p>
             <a:r>
-              <a:rPr lang="pt-BR" smtClean="0"/>
-              <a:t>Experimento 1</a:t>
+              <a:rPr lang="pt-BR" dirty="0"/>
+              <a:t>Experimento </a:t>
+            </a:r>
+            <a:r>
+              <a:rPr lang="pt-BR" dirty="0" smtClean="0"/>
+              <a:t>1</a:t>
             </a:r>
             <a:endParaRPr lang="pt-BR" dirty="0"/>
           </a:p>
@@ -10251,7 +10251,6 @@
           <a:p>
             <a:fld id="{E15E65B2-3271-4EB1-B955-03EC741CF5EC}" type="slidenum">
               <a:rPr lang="pt-BR" smtClean="0"/>
-              <a:pPr/>
               <a:t>19</a:t>
             </a:fld>
             <a:endParaRPr lang="pt-BR"/>
@@ -10261,7 +10260,7 @@
     </p:spTree>
     <p:extLst>
       <p:ext uri="{BB962C8B-B14F-4D97-AF65-F5344CB8AC3E}">
-        <p14:creationId xmlns:p14="http://schemas.microsoft.com/office/powerpoint/2010/main" val="1077336771"/>
+        <p14:creationId xmlns:p14="http://schemas.microsoft.com/office/powerpoint/2010/main" val="1010192082"/>
       </p:ext>
     </p:extLst>
   </p:cSld>
@@ -10533,14 +10532,12 @@
         </p:nvSpPr>
         <p:spPr/>
         <p:txBody>
-          <a:bodyPr>
-            <a:normAutofit/>
-          </a:bodyPr>
+          <a:bodyPr/>
           <a:lstStyle/>
           <a:p>
             <a:r>
               <a:rPr lang="pt-BR" dirty="0" smtClean="0"/>
-              <a:t>Memórias</a:t>
+              <a:t>Resultado</a:t>
             </a:r>
             <a:endParaRPr lang="pt-BR" dirty="0"/>
           </a:p>
@@ -10548,26 +10545,64 @@
       </p:sp>
       <p:sp>
         <p:nvSpPr>
-          <p:cNvPr id="7" name="Espaço Reservado para Texto 6"/>
-          <p:cNvSpPr>
-            <a:spLocks noGrp="1"/>
-          </p:cNvSpPr>
-          <p:nvPr>
-            <p:ph type="body" idx="1"/>
-          </p:nvPr>
-        </p:nvSpPr>
-        <p:spPr/>
-        <p:txBody>
-          <a:bodyPr/>
-          <a:lstStyle/>
-          <a:p>
-            <a:r>
-              <a:rPr lang="pt-BR" dirty="0"/>
-              <a:t>Experimento 2</a:t>
-            </a:r>
-          </a:p>
-        </p:txBody>
-      </p:sp>
+          <p:cNvPr id="13" name="Espaço Reservado para Conteúdo 12"/>
+          <p:cNvSpPr>
+            <a:spLocks noGrp="1"/>
+          </p:cNvSpPr>
+          <p:nvPr>
+            <p:ph sz="half" idx="1"/>
+          </p:nvPr>
+        </p:nvSpPr>
+        <p:spPr>
+          <a:xfrm>
+            <a:off x="457200" y="1600200"/>
+            <a:ext cx="4834880" cy="4525963"/>
+          </a:xfrm>
+        </p:spPr>
+        <p:txBody>
+          <a:bodyPr/>
+          <a:lstStyle/>
+          <a:p>
+            <a:pPr marL="0" indent="0">
+              <a:buNone/>
+            </a:pPr>
+            <a:r>
+              <a:rPr lang="pt-BR" dirty="0" smtClean="0"/>
+              <a:t>Experimento bem sucedido</a:t>
+            </a:r>
+            <a:endParaRPr lang="pt-BR" dirty="0"/>
+          </a:p>
+        </p:txBody>
+      </p:sp>
+      <p:pic>
+        <p:nvPicPr>
+          <p:cNvPr id="15" name="Espaço Reservado para Conteúdo 14"/>
+          <p:cNvPicPr>
+            <a:picLocks noGrp="1" noChangeAspect="1"/>
+          </p:cNvPicPr>
+          <p:nvPr>
+            <p:ph sz="half" idx="2"/>
+          </p:nvPr>
+        </p:nvPicPr>
+        <p:blipFill>
+          <a:blip r:embed="rId3" cstate="print">
+            <a:extLst>
+              <a:ext uri="{28A0092B-C50C-407E-A947-70E740481C1C}">
+                <a14:useLocalDpi xmlns:a14="http://schemas.microsoft.com/office/drawing/2010/main" val="0"/>
+              </a:ext>
+            </a:extLst>
+          </a:blip>
+          <a:stretch>
+            <a:fillRect/>
+          </a:stretch>
+        </p:blipFill>
+        <p:spPr>
+          <a:xfrm>
+            <a:off x="5378557" y="1600200"/>
+            <a:ext cx="2577886" cy="4525963"/>
+          </a:xfrm>
+        </p:spPr>
+      </p:pic>
       <p:sp>
         <p:nvSpPr>
           <p:cNvPr id="4" name="Espaço Reservado para Data 3"/>
@@ -10606,7 +10641,11 @@
           <a:bodyPr/>
           <a:lstStyle/>
           <a:p>
-            <a:endParaRPr lang="pt-BR"/>
+            <a:r>
+              <a:rPr lang="pt-BR" smtClean="0"/>
+              <a:t>Experimento 1</a:t>
+            </a:r>
+            <a:endParaRPr lang="pt-BR" dirty="0"/>
           </a:p>
         </p:txBody>
       </p:sp>
@@ -10627,6 +10666,7 @@
           <a:p>
             <a:fld id="{E15E65B2-3271-4EB1-B955-03EC741CF5EC}" type="slidenum">
               <a:rPr lang="pt-BR" smtClean="0"/>
+              <a:pPr/>
               <a:t>20</a:t>
             </a:fld>
             <a:endParaRPr lang="pt-BR"/>
@@ -10636,7 +10676,7 @@
     </p:spTree>
     <p:extLst>
       <p:ext uri="{BB962C8B-B14F-4D97-AF65-F5344CB8AC3E}">
-        <p14:creationId xmlns:p14="http://schemas.microsoft.com/office/powerpoint/2010/main" val="1049227361"/>
+        <p14:creationId xmlns:p14="http://schemas.microsoft.com/office/powerpoint/2010/main" val="1077336771"/>
       </p:ext>
     </p:extLst>
   </p:cSld>
@@ -10682,6 +10722,155 @@
         </p:nvSpPr>
         <p:spPr/>
         <p:txBody>
+          <a:bodyPr>
+            <a:normAutofit/>
+          </a:bodyPr>
+          <a:lstStyle/>
+          <a:p>
+            <a:r>
+              <a:rPr lang="pt-BR" dirty="0" smtClean="0"/>
+              <a:t>Memórias</a:t>
+            </a:r>
+            <a:endParaRPr lang="pt-BR" dirty="0"/>
+          </a:p>
+        </p:txBody>
+      </p:sp>
+      <p:sp>
+        <p:nvSpPr>
+          <p:cNvPr id="7" name="Espaço Reservado para Texto 6"/>
+          <p:cNvSpPr>
+            <a:spLocks noGrp="1"/>
+          </p:cNvSpPr>
+          <p:nvPr>
+            <p:ph type="body" idx="1"/>
+          </p:nvPr>
+        </p:nvSpPr>
+        <p:spPr/>
+        <p:txBody>
+          <a:bodyPr/>
+          <a:lstStyle/>
+          <a:p>
+            <a:r>
+              <a:rPr lang="pt-BR" dirty="0"/>
+              <a:t>Experimento 2</a:t>
+            </a:r>
+          </a:p>
+        </p:txBody>
+      </p:sp>
+      <p:sp>
+        <p:nvSpPr>
+          <p:cNvPr id="4" name="Espaço Reservado para Data 3"/>
+          <p:cNvSpPr>
+            <a:spLocks noGrp="1"/>
+          </p:cNvSpPr>
+          <p:nvPr>
+            <p:ph type="dt" sz="half" idx="10"/>
+          </p:nvPr>
+        </p:nvSpPr>
+        <p:spPr/>
+        <p:txBody>
+          <a:bodyPr/>
+          <a:lstStyle/>
+          <a:p>
+            <a:r>
+              <a:rPr lang="pt-BR" smtClean="0"/>
+              <a:t>16 de dezembro de 2013</a:t>
+            </a:r>
+            <a:endParaRPr lang="pt-BR"/>
+          </a:p>
+        </p:txBody>
+      </p:sp>
+      <p:sp>
+        <p:nvSpPr>
+          <p:cNvPr id="5" name="Espaço Reservado para Rodapé 4"/>
+          <p:cNvSpPr>
+            <a:spLocks noGrp="1"/>
+          </p:cNvSpPr>
+          <p:nvPr>
+            <p:ph type="ftr" sz="quarter" idx="11"/>
+          </p:nvPr>
+        </p:nvSpPr>
+        <p:spPr/>
+        <p:txBody>
+          <a:bodyPr/>
+          <a:lstStyle/>
+          <a:p>
+            <a:endParaRPr lang="pt-BR"/>
+          </a:p>
+        </p:txBody>
+      </p:sp>
+      <p:sp>
+        <p:nvSpPr>
+          <p:cNvPr id="6" name="Espaço Reservado para Número de Slide 5"/>
+          <p:cNvSpPr>
+            <a:spLocks noGrp="1"/>
+          </p:cNvSpPr>
+          <p:nvPr>
+            <p:ph type="sldNum" sz="quarter" idx="12"/>
+          </p:nvPr>
+        </p:nvSpPr>
+        <p:spPr/>
+        <p:txBody>
+          <a:bodyPr/>
+          <a:lstStyle/>
+          <a:p>
+            <a:fld id="{E15E65B2-3271-4EB1-B955-03EC741CF5EC}" type="slidenum">
+              <a:rPr lang="pt-BR" smtClean="0"/>
+              <a:t>21</a:t>
+            </a:fld>
+            <a:endParaRPr lang="pt-BR"/>
+          </a:p>
+        </p:txBody>
+      </p:sp>
+    </p:spTree>
+    <p:extLst>
+      <p:ext uri="{BB962C8B-B14F-4D97-AF65-F5344CB8AC3E}">
+        <p14:creationId xmlns:p14="http://schemas.microsoft.com/office/powerpoint/2010/main" val="1049227361"/>
+      </p:ext>
+    </p:extLst>
+  </p:cSld>
+  <p:clrMapOvr>
+    <a:masterClrMapping/>
+  </p:clrMapOvr>
+  <p:timing>
+    <p:tnLst>
+      <p:par>
+        <p:cTn id="1" dur="indefinite" restart="never" nodeType="tmRoot"/>
+      </p:par>
+    </p:tnLst>
+  </p:timing>
+</p:sld>
+</file>
+
+<file path=ppt/slides/slide22.xml><?xml version="1.0" encoding="utf-8"?>
+<p:sld xmlns:a="http://schemas.openxmlformats.org/drawingml/2006/main" xmlns:r="http://schemas.openxmlformats.org/officeDocument/2006/relationships" xmlns:p="http://schemas.openxmlformats.org/presentationml/2006/main">
+  <p:cSld>
+    <p:spTree>
+      <p:nvGrpSpPr>
+        <p:cNvPr id="1" name=""/>
+        <p:cNvGrpSpPr/>
+        <p:nvPr/>
+      </p:nvGrpSpPr>
+      <p:grpSpPr>
+        <a:xfrm>
+          <a:off x="0" y="0"/>
+          <a:ext cx="0" cy="0"/>
+          <a:chOff x="0" y="0"/>
+          <a:chExt cx="0" cy="0"/>
+        </a:xfrm>
+      </p:grpSpPr>
+      <p:sp>
+        <p:nvSpPr>
+          <p:cNvPr id="2" name="Título 1"/>
+          <p:cNvSpPr>
+            <a:spLocks noGrp="1"/>
+          </p:cNvSpPr>
+          <p:nvPr>
+            <p:ph type="title"/>
+          </p:nvPr>
+        </p:nvSpPr>
+        <p:spPr/>
+        <p:txBody>
           <a:bodyPr/>
           <a:lstStyle/>
           <a:p>
@@ -10851,7 +11040,7 @@
           <a:p>
             <a:fld id="{E15E65B2-3271-4EB1-B955-03EC741CF5EC}" type="slidenum">
               <a:rPr lang="pt-BR" smtClean="0"/>
-              <a:t>21</a:t>
+              <a:t>22</a:t>
             </a:fld>
             <a:endParaRPr lang="pt-BR"/>
           </a:p>
@@ -11247,7 +11436,7 @@
 </p:sld>
 </file>
 
-<file path=ppt/slides/slide22.xml><?xml version="1.0" encoding="utf-8"?>
+<file path=ppt/slides/slide23.xml><?xml version="1.0" encoding="utf-8"?>
 <p:sld xmlns:a="http://schemas.openxmlformats.org/drawingml/2006/main" xmlns:r="http://schemas.openxmlformats.org/officeDocument/2006/relationships" xmlns:p="http://schemas.openxmlformats.org/presentationml/2006/main">
   <p:cSld>
     <p:spTree>
@@ -11379,7 +11568,7 @@
           <a:p>
             <a:fld id="{E15E65B2-3271-4EB1-B955-03EC741CF5EC}" type="slidenum">
               <a:rPr lang="pt-BR" smtClean="0"/>
-              <a:t>22</a:t>
+              <a:t>23</a:t>
             </a:fld>
             <a:endParaRPr lang="pt-BR"/>
           </a:p>
@@ -11513,161 +11702,6 @@
 </p:sld>
 </file>
 
-<file path=ppt/slides/slide23.xml><?xml version="1.0" encoding="utf-8"?>
-<p:sld xmlns:a="http://schemas.openxmlformats.org/drawingml/2006/main" xmlns:r="http://schemas.openxmlformats.org/officeDocument/2006/relationships" xmlns:p="http://schemas.openxmlformats.org/presentationml/2006/main">
-  <p:cSld>
-    <p:spTree>
-      <p:nvGrpSpPr>
-        <p:cNvPr id="1" name=""/>
-        <p:cNvGrpSpPr/>
-        <p:nvPr/>
-      </p:nvGrpSpPr>
-      <p:grpSpPr>
-        <a:xfrm>
-          <a:off x="0" y="0"/>
-          <a:ext cx="0" cy="0"/>
-          <a:chOff x="0" y="0"/>
-          <a:chExt cx="0" cy="0"/>
-        </a:xfrm>
-      </p:grpSpPr>
-      <p:sp>
-        <p:nvSpPr>
-          <p:cNvPr id="2" name="Título 1"/>
-          <p:cNvSpPr>
-            <a:spLocks noGrp="1"/>
-          </p:cNvSpPr>
-          <p:nvPr>
-            <p:ph type="title"/>
-          </p:nvPr>
-        </p:nvSpPr>
-        <p:spPr/>
-        <p:txBody>
-          <a:bodyPr/>
-          <a:lstStyle/>
-          <a:p>
-            <a:r>
-              <a:rPr lang="pt-BR" dirty="0" smtClean="0"/>
-              <a:t>Resultados</a:t>
-            </a:r>
-            <a:endParaRPr lang="pt-BR" dirty="0"/>
-          </a:p>
-        </p:txBody>
-      </p:sp>
-      <p:sp>
-        <p:nvSpPr>
-          <p:cNvPr id="3" name="Espaço Reservado para Conteúdo 2"/>
-          <p:cNvSpPr>
-            <a:spLocks noGrp="1"/>
-          </p:cNvSpPr>
-          <p:nvPr>
-            <p:ph idx="1"/>
-          </p:nvPr>
-        </p:nvSpPr>
-        <p:spPr/>
-        <p:txBody>
-          <a:bodyPr/>
-          <a:lstStyle/>
-          <a:p>
-            <a:pPr marL="0" indent="0">
-              <a:buNone/>
-            </a:pPr>
-            <a:r>
-              <a:rPr lang="pt-BR" dirty="0" smtClean="0"/>
-              <a:t>Experimento bem sucedido</a:t>
-            </a:r>
-            <a:endParaRPr lang="pt-BR" dirty="0"/>
-          </a:p>
-        </p:txBody>
-      </p:sp>
-      <p:sp>
-        <p:nvSpPr>
-          <p:cNvPr id="4" name="Espaço Reservado para Data 3"/>
-          <p:cNvSpPr>
-            <a:spLocks noGrp="1"/>
-          </p:cNvSpPr>
-          <p:nvPr>
-            <p:ph type="dt" sz="half" idx="10"/>
-          </p:nvPr>
-        </p:nvSpPr>
-        <p:spPr/>
-        <p:txBody>
-          <a:bodyPr/>
-          <a:lstStyle/>
-          <a:p>
-            <a:r>
-              <a:rPr lang="pt-BR" smtClean="0"/>
-              <a:t>16 de dezembro de 2013</a:t>
-            </a:r>
-            <a:endParaRPr lang="pt-BR"/>
-          </a:p>
-        </p:txBody>
-      </p:sp>
-      <p:sp>
-        <p:nvSpPr>
-          <p:cNvPr id="5" name="Espaço Reservado para Rodapé 4"/>
-          <p:cNvSpPr>
-            <a:spLocks noGrp="1"/>
-          </p:cNvSpPr>
-          <p:nvPr>
-            <p:ph type="ftr" sz="quarter" idx="11"/>
-          </p:nvPr>
-        </p:nvSpPr>
-        <p:spPr/>
-        <p:txBody>
-          <a:bodyPr/>
-          <a:lstStyle/>
-          <a:p>
-            <a:r>
-              <a:rPr lang="pt-BR" dirty="0" smtClean="0"/>
-              <a:t>Experimento 2</a:t>
-            </a:r>
-            <a:endParaRPr lang="pt-BR" dirty="0"/>
-          </a:p>
-        </p:txBody>
-      </p:sp>
-      <p:sp>
-        <p:nvSpPr>
-          <p:cNvPr id="6" name="Espaço Reservado para Número de Slide 5"/>
-          <p:cNvSpPr>
-            <a:spLocks noGrp="1"/>
-          </p:cNvSpPr>
-          <p:nvPr>
-            <p:ph type="sldNum" sz="quarter" idx="12"/>
-          </p:nvPr>
-        </p:nvSpPr>
-        <p:spPr/>
-        <p:txBody>
-          <a:bodyPr/>
-          <a:lstStyle/>
-          <a:p>
-            <a:fld id="{E15E65B2-3271-4EB1-B955-03EC741CF5EC}" type="slidenum">
-              <a:rPr lang="pt-BR" smtClean="0"/>
-              <a:t>23</a:t>
-            </a:fld>
-            <a:endParaRPr lang="pt-BR"/>
-          </a:p>
-        </p:txBody>
-      </p:sp>
-    </p:spTree>
-    <p:extLst>
-      <p:ext uri="{BB962C8B-B14F-4D97-AF65-F5344CB8AC3E}">
-        <p14:creationId xmlns:p14="http://schemas.microsoft.com/office/powerpoint/2010/main" val="3907980999"/>
-      </p:ext>
-    </p:extLst>
-  </p:cSld>
-  <p:clrMapOvr>
-    <a:masterClrMapping/>
-  </p:clrMapOvr>
-  <p:timing>
-    <p:tnLst>
-      <p:par>
-        <p:cTn id="1" dur="indefinite" restart="never" nodeType="tmRoot"/>
-      </p:par>
-    </p:tnLst>
-  </p:timing>
-</p:sld>
-</file>
-
 <file path=ppt/slides/slide24.xml><?xml version="1.0" encoding="utf-8"?>
 <p:sld xmlns:a="http://schemas.openxmlformats.org/drawingml/2006/main" xmlns:r="http://schemas.openxmlformats.org/officeDocument/2006/relationships" xmlns:p="http://schemas.openxmlformats.org/presentationml/2006/main">
   <p:cSld>
@@ -11697,38 +11731,40 @@
         </p:nvSpPr>
         <p:spPr/>
         <p:txBody>
-          <a:bodyPr>
-            <a:normAutofit/>
-          </a:bodyPr>
-          <a:lstStyle/>
-          <a:p>
-            <a:r>
-              <a:rPr lang="pt-BR" i="1" dirty="0" smtClean="0"/>
-              <a:t>Bootloader</a:t>
-            </a:r>
-            <a:endParaRPr lang="pt-BR" i="1" dirty="0"/>
-          </a:p>
-        </p:txBody>
-      </p:sp>
-      <p:sp>
-        <p:nvSpPr>
-          <p:cNvPr id="7" name="Espaço Reservado para Texto 6"/>
-          <p:cNvSpPr>
-            <a:spLocks noGrp="1"/>
-          </p:cNvSpPr>
-          <p:nvPr>
-            <p:ph type="body" idx="1"/>
-          </p:nvPr>
-        </p:nvSpPr>
-        <p:spPr/>
-        <p:txBody>
-          <a:bodyPr/>
-          <a:lstStyle/>
-          <a:p>
-            <a:r>
-              <a:rPr lang="pt-BR" dirty="0"/>
-              <a:t>Experimento 3</a:t>
-            </a:r>
+          <a:bodyPr/>
+          <a:lstStyle/>
+          <a:p>
+            <a:r>
+              <a:rPr lang="pt-BR" dirty="0" smtClean="0"/>
+              <a:t>Resultados</a:t>
+            </a:r>
+            <a:endParaRPr lang="pt-BR" dirty="0"/>
+          </a:p>
+        </p:txBody>
+      </p:sp>
+      <p:sp>
+        <p:nvSpPr>
+          <p:cNvPr id="3" name="Espaço Reservado para Conteúdo 2"/>
+          <p:cNvSpPr>
+            <a:spLocks noGrp="1"/>
+          </p:cNvSpPr>
+          <p:nvPr>
+            <p:ph idx="1"/>
+          </p:nvPr>
+        </p:nvSpPr>
+        <p:spPr/>
+        <p:txBody>
+          <a:bodyPr/>
+          <a:lstStyle/>
+          <a:p>
+            <a:pPr marL="0" indent="0">
+              <a:buNone/>
+            </a:pPr>
+            <a:r>
+              <a:rPr lang="pt-BR" dirty="0" smtClean="0"/>
+              <a:t>Experimento bem sucedido</a:t>
+            </a:r>
+            <a:endParaRPr lang="pt-BR" dirty="0"/>
           </a:p>
         </p:txBody>
       </p:sp>
@@ -11770,7 +11806,11 @@
           <a:bodyPr/>
           <a:lstStyle/>
           <a:p>
-            <a:endParaRPr lang="pt-BR"/>
+            <a:r>
+              <a:rPr lang="pt-BR" dirty="0" smtClean="0"/>
+              <a:t>Experimento 2</a:t>
+            </a:r>
+            <a:endParaRPr lang="pt-BR" dirty="0"/>
           </a:p>
         </p:txBody>
       </p:sp>
@@ -11800,7 +11840,7 @@
     </p:spTree>
     <p:extLst>
       <p:ext uri="{BB962C8B-B14F-4D97-AF65-F5344CB8AC3E}">
-        <p14:creationId xmlns:p14="http://schemas.microsoft.com/office/powerpoint/2010/main" val="1238485748"/>
+        <p14:creationId xmlns:p14="http://schemas.microsoft.com/office/powerpoint/2010/main" val="3907980999"/>
       </p:ext>
     </p:extLst>
   </p:cSld>
@@ -11846,42 +11886,41 @@
         </p:nvSpPr>
         <p:spPr/>
         <p:txBody>
-          <a:bodyPr/>
-          <a:lstStyle/>
-          <a:p>
-            <a:endParaRPr lang="pt-BR" dirty="0"/>
-          </a:p>
-        </p:txBody>
-      </p:sp>
-      <p:pic>
-        <p:nvPicPr>
-          <p:cNvPr id="7" name="Espaço Reservado para Conteúdo 6"/>
-          <p:cNvPicPr>
-            <a:picLocks noGrp="1" noChangeAspect="1"/>
-          </p:cNvPicPr>
-          <p:nvPr>
-            <p:ph idx="1"/>
-          </p:nvPr>
-        </p:nvPicPr>
-        <p:blipFill>
-          <a:blip r:embed="rId3">
-            <a:extLst>
-              <a:ext uri="{28A0092B-C50C-407E-A947-70E740481C1C}">
-                <a14:useLocalDpi xmlns:a14="http://schemas.microsoft.com/office/drawing/2010/main" val="0"/>
-              </a:ext>
-            </a:extLst>
-          </a:blip>
-          <a:stretch>
-            <a:fillRect/>
-          </a:stretch>
-        </p:blipFill>
-        <p:spPr>
-          <a:xfrm>
-            <a:off x="2075688" y="1179576"/>
-            <a:ext cx="4992624" cy="4498848"/>
-          </a:xfrm>
-        </p:spPr>
-      </p:pic>
+          <a:bodyPr>
+            <a:normAutofit/>
+          </a:bodyPr>
+          <a:lstStyle/>
+          <a:p>
+            <a:r>
+              <a:rPr lang="pt-BR" i="1" dirty="0" smtClean="0"/>
+              <a:t>Bootloader</a:t>
+            </a:r>
+            <a:endParaRPr lang="pt-BR" i="1" dirty="0"/>
+          </a:p>
+        </p:txBody>
+      </p:sp>
+      <p:sp>
+        <p:nvSpPr>
+          <p:cNvPr id="7" name="Espaço Reservado para Texto 6"/>
+          <p:cNvSpPr>
+            <a:spLocks noGrp="1"/>
+          </p:cNvSpPr>
+          <p:nvPr>
+            <p:ph type="body" idx="1"/>
+          </p:nvPr>
+        </p:nvSpPr>
+        <p:spPr/>
+        <p:txBody>
+          <a:bodyPr/>
+          <a:lstStyle/>
+          <a:p>
+            <a:r>
+              <a:rPr lang="pt-BR" dirty="0"/>
+              <a:t>Experimento 3</a:t>
+            </a:r>
+          </a:p>
+        </p:txBody>
+      </p:sp>
       <p:sp>
         <p:nvSpPr>
           <p:cNvPr id="4" name="Espaço Reservado para Data 3"/>
@@ -11920,10 +11959,7 @@
           <a:bodyPr/>
           <a:lstStyle/>
           <a:p>
-            <a:r>
-              <a:rPr lang="pt-BR" dirty="0" smtClean="0"/>
-              <a:t>Experimento 3</a:t>
-            </a:r>
+            <a:endParaRPr lang="pt-BR"/>
           </a:p>
         </p:txBody>
       </p:sp>
@@ -11953,7 +11989,7 @@
     </p:spTree>
     <p:extLst>
       <p:ext uri="{BB962C8B-B14F-4D97-AF65-F5344CB8AC3E}">
-        <p14:creationId xmlns:p14="http://schemas.microsoft.com/office/powerpoint/2010/main" val="840518965"/>
+        <p14:creationId xmlns:p14="http://schemas.microsoft.com/office/powerpoint/2010/main" val="1238485748"/>
       </p:ext>
     </p:extLst>
   </p:cSld>
@@ -12002,6 +12038,159 @@
           <a:bodyPr/>
           <a:lstStyle/>
           <a:p>
+            <a:endParaRPr lang="pt-BR" dirty="0"/>
+          </a:p>
+        </p:txBody>
+      </p:sp>
+      <p:pic>
+        <p:nvPicPr>
+          <p:cNvPr id="7" name="Espaço Reservado para Conteúdo 6"/>
+          <p:cNvPicPr>
+            <a:picLocks noGrp="1" noChangeAspect="1"/>
+          </p:cNvPicPr>
+          <p:nvPr>
+            <p:ph idx="1"/>
+          </p:nvPr>
+        </p:nvPicPr>
+        <p:blipFill>
+          <a:blip r:embed="rId3">
+            <a:extLst>
+              <a:ext uri="{28A0092B-C50C-407E-A947-70E740481C1C}">
+                <a14:useLocalDpi xmlns:a14="http://schemas.microsoft.com/office/drawing/2010/main" val="0"/>
+              </a:ext>
+            </a:extLst>
+          </a:blip>
+          <a:stretch>
+            <a:fillRect/>
+          </a:stretch>
+        </p:blipFill>
+        <p:spPr>
+          <a:xfrm>
+            <a:off x="2075688" y="1179576"/>
+            <a:ext cx="4992624" cy="4498848"/>
+          </a:xfrm>
+        </p:spPr>
+      </p:pic>
+      <p:sp>
+        <p:nvSpPr>
+          <p:cNvPr id="4" name="Espaço Reservado para Data 3"/>
+          <p:cNvSpPr>
+            <a:spLocks noGrp="1"/>
+          </p:cNvSpPr>
+          <p:nvPr>
+            <p:ph type="dt" sz="half" idx="10"/>
+          </p:nvPr>
+        </p:nvSpPr>
+        <p:spPr/>
+        <p:txBody>
+          <a:bodyPr/>
+          <a:lstStyle/>
+          <a:p>
+            <a:r>
+              <a:rPr lang="pt-BR" smtClean="0"/>
+              <a:t>16 de dezembro de 2013</a:t>
+            </a:r>
+            <a:endParaRPr lang="pt-BR"/>
+          </a:p>
+        </p:txBody>
+      </p:sp>
+      <p:sp>
+        <p:nvSpPr>
+          <p:cNvPr id="5" name="Espaço Reservado para Rodapé 4"/>
+          <p:cNvSpPr>
+            <a:spLocks noGrp="1"/>
+          </p:cNvSpPr>
+          <p:nvPr>
+            <p:ph type="ftr" sz="quarter" idx="11"/>
+          </p:nvPr>
+        </p:nvSpPr>
+        <p:spPr/>
+        <p:txBody>
+          <a:bodyPr/>
+          <a:lstStyle/>
+          <a:p>
+            <a:r>
+              <a:rPr lang="pt-BR" dirty="0" smtClean="0"/>
+              <a:t>Experimento 3</a:t>
+            </a:r>
+          </a:p>
+        </p:txBody>
+      </p:sp>
+      <p:sp>
+        <p:nvSpPr>
+          <p:cNvPr id="6" name="Espaço Reservado para Número de Slide 5"/>
+          <p:cNvSpPr>
+            <a:spLocks noGrp="1"/>
+          </p:cNvSpPr>
+          <p:nvPr>
+            <p:ph type="sldNum" sz="quarter" idx="12"/>
+          </p:nvPr>
+        </p:nvSpPr>
+        <p:spPr/>
+        <p:txBody>
+          <a:bodyPr/>
+          <a:lstStyle/>
+          <a:p>
+            <a:fld id="{E15E65B2-3271-4EB1-B955-03EC741CF5EC}" type="slidenum">
+              <a:rPr lang="pt-BR" smtClean="0"/>
+              <a:t>26</a:t>
+            </a:fld>
+            <a:endParaRPr lang="pt-BR"/>
+          </a:p>
+        </p:txBody>
+      </p:sp>
+    </p:spTree>
+    <p:extLst>
+      <p:ext uri="{BB962C8B-B14F-4D97-AF65-F5344CB8AC3E}">
+        <p14:creationId xmlns:p14="http://schemas.microsoft.com/office/powerpoint/2010/main" val="840518965"/>
+      </p:ext>
+    </p:extLst>
+  </p:cSld>
+  <p:clrMapOvr>
+    <a:masterClrMapping/>
+  </p:clrMapOvr>
+  <p:timing>
+    <p:tnLst>
+      <p:par>
+        <p:cTn id="1" dur="indefinite" restart="never" nodeType="tmRoot"/>
+      </p:par>
+    </p:tnLst>
+  </p:timing>
+</p:sld>
+</file>
+
+<file path=ppt/slides/slide27.xml><?xml version="1.0" encoding="utf-8"?>
+<p:sld xmlns:a="http://schemas.openxmlformats.org/drawingml/2006/main" xmlns:r="http://schemas.openxmlformats.org/officeDocument/2006/relationships" xmlns:p="http://schemas.openxmlformats.org/presentationml/2006/main">
+  <p:cSld>
+    <p:spTree>
+      <p:nvGrpSpPr>
+        <p:cNvPr id="1" name=""/>
+        <p:cNvGrpSpPr/>
+        <p:nvPr/>
+      </p:nvGrpSpPr>
+      <p:grpSpPr>
+        <a:xfrm>
+          <a:off x="0" y="0"/>
+          <a:ext cx="0" cy="0"/>
+          <a:chOff x="0" y="0"/>
+          <a:chExt cx="0" cy="0"/>
+        </a:xfrm>
+      </p:grpSpPr>
+      <p:sp>
+        <p:nvSpPr>
+          <p:cNvPr id="2" name="Título 1"/>
+          <p:cNvSpPr>
+            <a:spLocks noGrp="1"/>
+          </p:cNvSpPr>
+          <p:nvPr>
+            <p:ph type="title"/>
+          </p:nvPr>
+        </p:nvSpPr>
+        <p:spPr/>
+        <p:txBody>
+          <a:bodyPr/>
+          <a:lstStyle/>
+          <a:p>
             <a:r>
               <a:rPr lang="pt-BR" dirty="0" smtClean="0"/>
               <a:t>Arquivo Binário</a:t>
@@ -12101,7 +12290,7 @@
           <a:p>
             <a:fld id="{E15E65B2-3271-4EB1-B955-03EC741CF5EC}" type="slidenum">
               <a:rPr lang="pt-BR" smtClean="0"/>
-              <a:t>26</a:t>
+              <a:t>27</a:t>
             </a:fld>
             <a:endParaRPr lang="pt-BR"/>
           </a:p>
@@ -12435,7 +12624,7 @@
 </p:sld>
 </file>
 
-<file path=ppt/slides/slide27.xml><?xml version="1.0" encoding="utf-8"?>
+<file path=ppt/slides/slide28.xml><?xml version="1.0" encoding="utf-8"?>
 <p:sld xmlns:a="http://schemas.openxmlformats.org/drawingml/2006/main" xmlns:r="http://schemas.openxmlformats.org/officeDocument/2006/relationships" xmlns:p="http://schemas.openxmlformats.org/presentationml/2006/main">
   <p:cSld>
     <p:spTree>
@@ -12573,7 +12762,7 @@
           <a:p>
             <a:fld id="{E15E65B2-3271-4EB1-B955-03EC741CF5EC}" type="slidenum">
               <a:rPr lang="pt-BR" smtClean="0"/>
-              <a:t>27</a:t>
+              <a:t>28</a:t>
             </a:fld>
             <a:endParaRPr lang="pt-BR"/>
           </a:p>
@@ -12628,7 +12817,7 @@
 </p:sld>
 </file>
 
-<file path=ppt/slides/slide28.xml><?xml version="1.0" encoding="utf-8"?>
+<file path=ppt/slides/slide29.xml><?xml version="1.0" encoding="utf-8"?>
 <p:sld xmlns:a="http://schemas.openxmlformats.org/drawingml/2006/main" xmlns:r="http://schemas.openxmlformats.org/officeDocument/2006/relationships" xmlns:p="http://schemas.openxmlformats.org/presentationml/2006/main">
   <p:cSld>
     <p:spTree>
@@ -12787,7 +12976,7 @@
           <a:p>
             <a:fld id="{E15E65B2-3271-4EB1-B955-03EC741CF5EC}" type="slidenum">
               <a:rPr lang="pt-BR" smtClean="0"/>
-              <a:t>28</a:t>
+              <a:t>29</a:t>
             </a:fld>
             <a:endParaRPr lang="pt-BR"/>
           </a:p>
@@ -12797,155 +12986,6 @@
     <p:extLst>
       <p:ext uri="{BB962C8B-B14F-4D97-AF65-F5344CB8AC3E}">
         <p14:creationId xmlns:p14="http://schemas.microsoft.com/office/powerpoint/2010/main" val="3382419477"/>
-      </p:ext>
-    </p:extLst>
-  </p:cSld>
-  <p:clrMapOvr>
-    <a:masterClrMapping/>
-  </p:clrMapOvr>
-  <p:timing>
-    <p:tnLst>
-      <p:par>
-        <p:cTn id="1" dur="indefinite" restart="never" nodeType="tmRoot"/>
-      </p:par>
-    </p:tnLst>
-  </p:timing>
-</p:sld>
-</file>
-
-<file path=ppt/slides/slide29.xml><?xml version="1.0" encoding="utf-8"?>
-<p:sld xmlns:a="http://schemas.openxmlformats.org/drawingml/2006/main" xmlns:r="http://schemas.openxmlformats.org/officeDocument/2006/relationships" xmlns:p="http://schemas.openxmlformats.org/presentationml/2006/main">
-  <p:cSld>
-    <p:spTree>
-      <p:nvGrpSpPr>
-        <p:cNvPr id="1" name=""/>
-        <p:cNvGrpSpPr/>
-        <p:nvPr/>
-      </p:nvGrpSpPr>
-      <p:grpSpPr>
-        <a:xfrm>
-          <a:off x="0" y="0"/>
-          <a:ext cx="0" cy="0"/>
-          <a:chOff x="0" y="0"/>
-          <a:chExt cx="0" cy="0"/>
-        </a:xfrm>
-      </p:grpSpPr>
-      <p:sp>
-        <p:nvSpPr>
-          <p:cNvPr id="2" name="Título 1"/>
-          <p:cNvSpPr>
-            <a:spLocks noGrp="1"/>
-          </p:cNvSpPr>
-          <p:nvPr>
-            <p:ph type="title"/>
-          </p:nvPr>
-        </p:nvSpPr>
-        <p:spPr/>
-        <p:txBody>
-          <a:bodyPr>
-            <a:normAutofit/>
-          </a:bodyPr>
-          <a:lstStyle/>
-          <a:p>
-            <a:r>
-              <a:rPr lang="pt-BR" dirty="0"/>
-              <a:t>Autorreconfiguração com MicroBlaze e DDR3</a:t>
-            </a:r>
-          </a:p>
-        </p:txBody>
-      </p:sp>
-      <p:sp>
-        <p:nvSpPr>
-          <p:cNvPr id="7" name="Espaço Reservado para Texto 6"/>
-          <p:cNvSpPr>
-            <a:spLocks noGrp="1"/>
-          </p:cNvSpPr>
-          <p:nvPr>
-            <p:ph type="body" idx="1"/>
-          </p:nvPr>
-        </p:nvSpPr>
-        <p:spPr/>
-        <p:txBody>
-          <a:bodyPr/>
-          <a:lstStyle/>
-          <a:p>
-            <a:r>
-              <a:rPr lang="pt-BR" dirty="0" smtClean="0"/>
-              <a:t>Experimento 4</a:t>
-            </a:r>
-            <a:endParaRPr lang="pt-BR" dirty="0"/>
-          </a:p>
-        </p:txBody>
-      </p:sp>
-      <p:sp>
-        <p:nvSpPr>
-          <p:cNvPr id="4" name="Espaço Reservado para Data 3"/>
-          <p:cNvSpPr>
-            <a:spLocks noGrp="1"/>
-          </p:cNvSpPr>
-          <p:nvPr>
-            <p:ph type="dt" sz="half" idx="10"/>
-          </p:nvPr>
-        </p:nvSpPr>
-        <p:spPr/>
-        <p:txBody>
-          <a:bodyPr/>
-          <a:lstStyle/>
-          <a:p>
-            <a:r>
-              <a:rPr lang="pt-BR" smtClean="0"/>
-              <a:t>16 de dezembro de 2013</a:t>
-            </a:r>
-            <a:endParaRPr lang="pt-BR"/>
-          </a:p>
-        </p:txBody>
-      </p:sp>
-      <p:sp>
-        <p:nvSpPr>
-          <p:cNvPr id="5" name="Espaço Reservado para Rodapé 4"/>
-          <p:cNvSpPr>
-            <a:spLocks noGrp="1"/>
-          </p:cNvSpPr>
-          <p:nvPr>
-            <p:ph type="ftr" sz="quarter" idx="11"/>
-          </p:nvPr>
-        </p:nvSpPr>
-        <p:spPr/>
-        <p:txBody>
-          <a:bodyPr/>
-          <a:lstStyle/>
-          <a:p>
-            <a:endParaRPr lang="pt-BR"/>
-          </a:p>
-        </p:txBody>
-      </p:sp>
-      <p:sp>
-        <p:nvSpPr>
-          <p:cNvPr id="6" name="Espaço Reservado para Número de Slide 5"/>
-          <p:cNvSpPr>
-            <a:spLocks noGrp="1"/>
-          </p:cNvSpPr>
-          <p:nvPr>
-            <p:ph type="sldNum" sz="quarter" idx="12"/>
-          </p:nvPr>
-        </p:nvSpPr>
-        <p:spPr/>
-        <p:txBody>
-          <a:bodyPr/>
-          <a:lstStyle/>
-          <a:p>
-            <a:fld id="{E15E65B2-3271-4EB1-B955-03EC741CF5EC}" type="slidenum">
-              <a:rPr lang="pt-BR" smtClean="0"/>
-              <a:t>29</a:t>
-            </a:fld>
-            <a:endParaRPr lang="pt-BR"/>
-          </a:p>
-        </p:txBody>
-      </p:sp>
-    </p:spTree>
-    <p:extLst>
-      <p:ext uri="{BB962C8B-B14F-4D97-AF65-F5344CB8AC3E}">
-        <p14:creationId xmlns:p14="http://schemas.microsoft.com/office/powerpoint/2010/main" val="1631175770"/>
       </p:ext>
     </p:extLst>
   </p:cSld>
@@ -13139,77 +13179,26 @@
         </p:nvSpPr>
         <p:spPr/>
         <p:txBody>
-          <a:bodyPr/>
-          <a:lstStyle/>
-          <a:p>
-            <a:r>
-              <a:rPr lang="pt-BR" dirty="0" smtClean="0"/>
-              <a:t>Fluxo de Projeto</a:t>
-            </a:r>
-            <a:endParaRPr lang="pt-BR" dirty="0"/>
-          </a:p>
-        </p:txBody>
-      </p:sp>
-      <p:pic>
-        <p:nvPicPr>
-          <p:cNvPr id="7" name="Espaço Reservado para Conteúdo 6"/>
-          <p:cNvPicPr>
-            <a:picLocks noGrp="1" noChangeAspect="1"/>
-          </p:cNvPicPr>
-          <p:nvPr>
-            <p:ph idx="1"/>
-          </p:nvPr>
-        </p:nvPicPr>
-        <p:blipFill>
-          <a:blip r:embed="rId3" cstate="print">
-            <a:extLst>
-              <a:ext uri="{28A0092B-C50C-407E-A947-70E740481C1C}">
-                <a14:useLocalDpi xmlns:a14="http://schemas.microsoft.com/office/drawing/2010/main" val="0"/>
-              </a:ext>
-            </a:extLst>
-          </a:blip>
-          <a:stretch>
-            <a:fillRect/>
-          </a:stretch>
-        </p:blipFill>
-        <p:spPr>
-          <a:xfrm>
-            <a:off x="457200" y="2945951"/>
-            <a:ext cx="8229600" cy="1834461"/>
-          </a:xfrm>
-        </p:spPr>
-      </p:pic>
-      <p:sp>
-        <p:nvSpPr>
-          <p:cNvPr id="4" name="Espaço Reservado para Data 3"/>
-          <p:cNvSpPr>
-            <a:spLocks noGrp="1"/>
-          </p:cNvSpPr>
-          <p:nvPr>
-            <p:ph type="dt" sz="half" idx="10"/>
-          </p:nvPr>
-        </p:nvSpPr>
-        <p:spPr/>
-        <p:txBody>
-          <a:bodyPr/>
-          <a:lstStyle/>
-          <a:p>
-            <a:r>
-              <a:rPr lang="pt-BR" smtClean="0"/>
-              <a:t>16 de dezembro de 2013</a:t>
-            </a:r>
-            <a:endParaRPr lang="pt-BR"/>
-          </a:p>
-        </p:txBody>
-      </p:sp>
-      <p:sp>
-        <p:nvSpPr>
-          <p:cNvPr id="5" name="Espaço Reservado para Rodapé 4"/>
-          <p:cNvSpPr>
-            <a:spLocks noGrp="1"/>
-          </p:cNvSpPr>
-          <p:nvPr>
-            <p:ph type="ftr" sz="quarter" idx="11"/>
+          <a:bodyPr>
+            <a:normAutofit/>
+          </a:bodyPr>
+          <a:lstStyle/>
+          <a:p>
+            <a:r>
+              <a:rPr lang="pt-BR" dirty="0"/>
+              <a:t>Autorreconfiguração com MicroBlaze e DDR3</a:t>
+            </a:r>
+          </a:p>
+        </p:txBody>
+      </p:sp>
+      <p:sp>
+        <p:nvSpPr>
+          <p:cNvPr id="7" name="Espaço Reservado para Texto 6"/>
+          <p:cNvSpPr>
+            <a:spLocks noGrp="1"/>
+          </p:cNvSpPr>
+          <p:nvPr>
+            <p:ph type="body" idx="1"/>
           </p:nvPr>
         </p:nvSpPr>
         <p:spPr/>
@@ -13222,6 +13211,48 @@
               <a:t>Experimento 4</a:t>
             </a:r>
             <a:endParaRPr lang="pt-BR" dirty="0"/>
+          </a:p>
+        </p:txBody>
+      </p:sp>
+      <p:sp>
+        <p:nvSpPr>
+          <p:cNvPr id="4" name="Espaço Reservado para Data 3"/>
+          <p:cNvSpPr>
+            <a:spLocks noGrp="1"/>
+          </p:cNvSpPr>
+          <p:nvPr>
+            <p:ph type="dt" sz="half" idx="10"/>
+          </p:nvPr>
+        </p:nvSpPr>
+        <p:spPr/>
+        <p:txBody>
+          <a:bodyPr/>
+          <a:lstStyle/>
+          <a:p>
+            <a:r>
+              <a:rPr lang="pt-BR" smtClean="0"/>
+              <a:t>16 de dezembro de 2013</a:t>
+            </a:r>
+            <a:endParaRPr lang="pt-BR"/>
+          </a:p>
+        </p:txBody>
+      </p:sp>
+      <p:sp>
+        <p:nvSpPr>
+          <p:cNvPr id="5" name="Espaço Reservado para Rodapé 4"/>
+          <p:cNvSpPr>
+            <a:spLocks noGrp="1"/>
+          </p:cNvSpPr>
+          <p:nvPr>
+            <p:ph type="ftr" sz="quarter" idx="11"/>
+          </p:nvPr>
+        </p:nvSpPr>
+        <p:spPr/>
+        <p:txBody>
+          <a:bodyPr/>
+          <a:lstStyle/>
+          <a:p>
+            <a:endParaRPr lang="pt-BR"/>
           </a:p>
         </p:txBody>
       </p:sp>
@@ -13251,7 +13282,7 @@
     </p:spTree>
     <p:extLst>
       <p:ext uri="{BB962C8B-B14F-4D97-AF65-F5344CB8AC3E}">
-        <p14:creationId xmlns:p14="http://schemas.microsoft.com/office/powerpoint/2010/main" val="1178305631"/>
+        <p14:creationId xmlns:p14="http://schemas.microsoft.com/office/powerpoint/2010/main" val="1631175770"/>
       </p:ext>
     </p:extLst>
   </p:cSld>
@@ -13302,55 +13333,41 @@
           <a:p>
             <a:r>
               <a:rPr lang="pt-BR" dirty="0" smtClean="0"/>
-              <a:t>Resultados</a:t>
+              <a:t>Fluxo de Projeto</a:t>
             </a:r>
             <a:endParaRPr lang="pt-BR" dirty="0"/>
           </a:p>
         </p:txBody>
       </p:sp>
-      <p:sp>
-        <p:nvSpPr>
-          <p:cNvPr id="8" name="Espaço Reservado para Conteúdo 7"/>
-          <p:cNvSpPr>
-            <a:spLocks noGrp="1"/>
-          </p:cNvSpPr>
+      <p:pic>
+        <p:nvPicPr>
+          <p:cNvPr id="7" name="Espaço Reservado para Conteúdo 6"/>
+          <p:cNvPicPr>
+            <a:picLocks noGrp="1" noChangeAspect="1"/>
+          </p:cNvPicPr>
           <p:nvPr>
             <p:ph idx="1"/>
           </p:nvPr>
-        </p:nvSpPr>
-        <p:spPr/>
-        <p:txBody>
-          <a:bodyPr/>
-          <a:lstStyle/>
-          <a:p>
-            <a:pPr marL="0" indent="0">
-              <a:buNone/>
-            </a:pPr>
-            <a:r>
-              <a:rPr lang="pt-BR" dirty="0" smtClean="0"/>
-              <a:t>Experimento requer modificações</a:t>
-            </a:r>
-          </a:p>
-          <a:p>
-            <a:r>
-              <a:rPr lang="pt-BR" dirty="0" smtClean="0"/>
-              <a:t>Remoção da DDR3</a:t>
-            </a:r>
-          </a:p>
-          <a:p>
-            <a:r>
-              <a:rPr lang="pt-BR" dirty="0" smtClean="0"/>
-              <a:t>Usar MicroBlaze como Top</a:t>
-            </a:r>
-          </a:p>
-          <a:p>
-            <a:endParaRPr lang="pt-BR" dirty="0" smtClean="0"/>
-          </a:p>
-          <a:p>
-            <a:endParaRPr lang="pt-BR" dirty="0"/>
-          </a:p>
-        </p:txBody>
-      </p:sp>
+        </p:nvPicPr>
+        <p:blipFill>
+          <a:blip r:embed="rId3" cstate="print">
+            <a:extLst>
+              <a:ext uri="{28A0092B-C50C-407E-A947-70E740481C1C}">
+                <a14:useLocalDpi xmlns:a14="http://schemas.microsoft.com/office/drawing/2010/main" val="0"/>
+              </a:ext>
+            </a:extLst>
+          </a:blip>
+          <a:stretch>
+            <a:fillRect/>
+          </a:stretch>
+        </p:blipFill>
+        <p:spPr>
+          <a:xfrm>
+            <a:off x="457200" y="2945951"/>
+            <a:ext cx="8229600" cy="1834461"/>
+          </a:xfrm>
+        </p:spPr>
+      </p:pic>
       <p:sp>
         <p:nvSpPr>
           <p:cNvPr id="4" name="Espaço Reservado para Data 3"/>
@@ -13423,7 +13440,7 @@
     </p:spTree>
     <p:extLst>
       <p:ext uri="{BB962C8B-B14F-4D97-AF65-F5344CB8AC3E}">
-        <p14:creationId xmlns:p14="http://schemas.microsoft.com/office/powerpoint/2010/main" val="3011382053"/>
+        <p14:creationId xmlns:p14="http://schemas.microsoft.com/office/powerpoint/2010/main" val="1178305631"/>
       </p:ext>
     </p:extLst>
   </p:cSld>
@@ -13469,18 +13486,12 @@
         </p:nvSpPr>
         <p:spPr/>
         <p:txBody>
-          <a:bodyPr>
-            <a:normAutofit/>
-          </a:bodyPr>
-          <a:lstStyle/>
-          <a:p>
-            <a:r>
-              <a:rPr lang="pt-BR" dirty="0"/>
-              <a:t>Autorreconfiguração com MicroBlaze e </a:t>
-            </a:r>
+          <a:bodyPr/>
+          <a:lstStyle/>
+          <a:p>
             <a:r>
               <a:rPr lang="pt-BR" dirty="0" smtClean="0"/>
-              <a:t>sem DDR3</a:t>
+              <a:t>Resultados</a:t>
             </a:r>
             <a:endParaRPr lang="pt-BR" dirty="0"/>
           </a:p>
@@ -13488,23 +13499,43 @@
       </p:sp>
       <p:sp>
         <p:nvSpPr>
-          <p:cNvPr id="7" name="Espaço Reservado para Texto 6"/>
-          <p:cNvSpPr>
-            <a:spLocks noGrp="1"/>
-          </p:cNvSpPr>
-          <p:nvPr>
-            <p:ph type="body" idx="1"/>
-          </p:nvPr>
-        </p:nvSpPr>
-        <p:spPr/>
-        <p:txBody>
-          <a:bodyPr/>
-          <a:lstStyle/>
-          <a:p>
+          <p:cNvPr id="8" name="Espaço Reservado para Conteúdo 7"/>
+          <p:cNvSpPr>
+            <a:spLocks noGrp="1"/>
+          </p:cNvSpPr>
+          <p:nvPr>
+            <p:ph idx="1"/>
+          </p:nvPr>
+        </p:nvSpPr>
+        <p:spPr/>
+        <p:txBody>
+          <a:bodyPr/>
+          <a:lstStyle/>
+          <a:p>
+            <a:pPr marL="0" indent="0">
+              <a:buNone/>
+            </a:pPr>
             <a:r>
               <a:rPr lang="pt-BR" dirty="0" smtClean="0"/>
-              <a:t>Experimento 5</a:t>
-            </a:r>
+              <a:t>Experimento requer modificações</a:t>
+            </a:r>
+          </a:p>
+          <a:p>
+            <a:r>
+              <a:rPr lang="pt-BR" dirty="0" smtClean="0"/>
+              <a:t>Remoção da DDR3</a:t>
+            </a:r>
+          </a:p>
+          <a:p>
+            <a:r>
+              <a:rPr lang="pt-BR" dirty="0" smtClean="0"/>
+              <a:t>Usar MicroBlaze como Top</a:t>
+            </a:r>
+          </a:p>
+          <a:p>
+            <a:endParaRPr lang="pt-BR" dirty="0" smtClean="0"/>
+          </a:p>
+          <a:p>
             <a:endParaRPr lang="pt-BR" dirty="0"/>
           </a:p>
         </p:txBody>
@@ -13547,7 +13578,11 @@
           <a:bodyPr/>
           <a:lstStyle/>
           <a:p>
-            <a:endParaRPr lang="pt-BR"/>
+            <a:r>
+              <a:rPr lang="pt-BR" dirty="0" smtClean="0"/>
+              <a:t>Experimento 4</a:t>
+            </a:r>
+            <a:endParaRPr lang="pt-BR" dirty="0"/>
           </a:p>
         </p:txBody>
       </p:sp>
@@ -13577,7 +13612,7 @@
     </p:spTree>
     <p:extLst>
       <p:ext uri="{BB962C8B-B14F-4D97-AF65-F5344CB8AC3E}">
-        <p14:creationId xmlns:p14="http://schemas.microsoft.com/office/powerpoint/2010/main" val="669085642"/>
+        <p14:creationId xmlns:p14="http://schemas.microsoft.com/office/powerpoint/2010/main" val="3011382053"/>
       </p:ext>
     </p:extLst>
   </p:cSld>
@@ -13623,77 +13658,31 @@
         </p:nvSpPr>
         <p:spPr/>
         <p:txBody>
-          <a:bodyPr/>
-          <a:lstStyle/>
-          <a:p>
+          <a:bodyPr>
+            <a:normAutofit/>
+          </a:bodyPr>
+          <a:lstStyle/>
+          <a:p>
+            <a:r>
+              <a:rPr lang="pt-BR" dirty="0"/>
+              <a:t>Autorreconfiguração com MicroBlaze e </a:t>
+            </a:r>
             <a:r>
               <a:rPr lang="pt-BR" dirty="0" smtClean="0"/>
-              <a:t>Fluxo de Projeto</a:t>
+              <a:t>sem DDR3</a:t>
             </a:r>
             <a:endParaRPr lang="pt-BR" dirty="0"/>
           </a:p>
         </p:txBody>
       </p:sp>
-      <p:pic>
-        <p:nvPicPr>
-          <p:cNvPr id="7" name="Espaço Reservado para Conteúdo 6"/>
-          <p:cNvPicPr>
-            <a:picLocks noGrp="1" noChangeAspect="1"/>
-          </p:cNvPicPr>
-          <p:nvPr>
-            <p:ph idx="1"/>
-          </p:nvPr>
-        </p:nvPicPr>
-        <p:blipFill>
-          <a:blip r:embed="rId3" cstate="print">
-            <a:extLst>
-              <a:ext uri="{28A0092B-C50C-407E-A947-70E740481C1C}">
-                <a14:useLocalDpi xmlns:a14="http://schemas.microsoft.com/office/drawing/2010/main" val="0"/>
-              </a:ext>
-            </a:extLst>
-          </a:blip>
-          <a:stretch>
-            <a:fillRect/>
-          </a:stretch>
-        </p:blipFill>
-        <p:spPr>
-          <a:xfrm>
-            <a:off x="457200" y="2708920"/>
-            <a:ext cx="8229600" cy="1834461"/>
-          </a:xfrm>
-        </p:spPr>
-      </p:pic>
-      <p:sp>
-        <p:nvSpPr>
-          <p:cNvPr id="4" name="Espaço Reservado para Data 3"/>
-          <p:cNvSpPr>
-            <a:spLocks noGrp="1"/>
-          </p:cNvSpPr>
-          <p:nvPr>
-            <p:ph type="dt" sz="half" idx="10"/>
-          </p:nvPr>
-        </p:nvSpPr>
-        <p:spPr/>
-        <p:txBody>
-          <a:bodyPr/>
-          <a:lstStyle/>
-          <a:p>
-            <a:r>
-              <a:rPr lang="pt-BR" smtClean="0"/>
-              <a:t>16 de dezembro de 2013</a:t>
-            </a:r>
-            <a:endParaRPr lang="pt-BR"/>
-          </a:p>
-        </p:txBody>
-      </p:sp>
-      <p:sp>
-        <p:nvSpPr>
-          <p:cNvPr id="5" name="Espaço Reservado para Rodapé 4"/>
-          <p:cNvSpPr>
-            <a:spLocks noGrp="1"/>
-          </p:cNvSpPr>
-          <p:nvPr>
-            <p:ph type="ftr" sz="quarter" idx="11"/>
+      <p:sp>
+        <p:nvSpPr>
+          <p:cNvPr id="7" name="Espaço Reservado para Texto 6"/>
+          <p:cNvSpPr>
+            <a:spLocks noGrp="1"/>
+          </p:cNvSpPr>
+          <p:nvPr>
+            <p:ph type="body" idx="1"/>
           </p:nvPr>
         </p:nvSpPr>
         <p:spPr/>
@@ -13705,6 +13694,49 @@
               <a:rPr lang="pt-BR" dirty="0" smtClean="0"/>
               <a:t>Experimento 5</a:t>
             </a:r>
+            <a:endParaRPr lang="pt-BR" dirty="0"/>
+          </a:p>
+        </p:txBody>
+      </p:sp>
+      <p:sp>
+        <p:nvSpPr>
+          <p:cNvPr id="4" name="Espaço Reservado para Data 3"/>
+          <p:cNvSpPr>
+            <a:spLocks noGrp="1"/>
+          </p:cNvSpPr>
+          <p:nvPr>
+            <p:ph type="dt" sz="half" idx="10"/>
+          </p:nvPr>
+        </p:nvSpPr>
+        <p:spPr/>
+        <p:txBody>
+          <a:bodyPr/>
+          <a:lstStyle/>
+          <a:p>
+            <a:r>
+              <a:rPr lang="pt-BR" smtClean="0"/>
+              <a:t>16 de dezembro de 2013</a:t>
+            </a:r>
+            <a:endParaRPr lang="pt-BR"/>
+          </a:p>
+        </p:txBody>
+      </p:sp>
+      <p:sp>
+        <p:nvSpPr>
+          <p:cNvPr id="5" name="Espaço Reservado para Rodapé 4"/>
+          <p:cNvSpPr>
+            <a:spLocks noGrp="1"/>
+          </p:cNvSpPr>
+          <p:nvPr>
+            <p:ph type="ftr" sz="quarter" idx="11"/>
+          </p:nvPr>
+        </p:nvSpPr>
+        <p:spPr/>
+        <p:txBody>
+          <a:bodyPr/>
+          <a:lstStyle/>
+          <a:p>
+            <a:endParaRPr lang="pt-BR"/>
           </a:p>
         </p:txBody>
       </p:sp>
@@ -13734,7 +13766,7 @@
     </p:spTree>
     <p:extLst>
       <p:ext uri="{BB962C8B-B14F-4D97-AF65-F5344CB8AC3E}">
-        <p14:creationId xmlns:p14="http://schemas.microsoft.com/office/powerpoint/2010/main" val="1197866311"/>
+        <p14:creationId xmlns:p14="http://schemas.microsoft.com/office/powerpoint/2010/main" val="669085642"/>
       </p:ext>
     </p:extLst>
   </p:cSld>
@@ -13785,6 +13817,163 @@
           <a:p>
             <a:r>
               <a:rPr lang="pt-BR" dirty="0" smtClean="0"/>
+              <a:t>Fluxo de Projeto</a:t>
+            </a:r>
+            <a:endParaRPr lang="pt-BR" dirty="0"/>
+          </a:p>
+        </p:txBody>
+      </p:sp>
+      <p:pic>
+        <p:nvPicPr>
+          <p:cNvPr id="7" name="Espaço Reservado para Conteúdo 6"/>
+          <p:cNvPicPr>
+            <a:picLocks noGrp="1" noChangeAspect="1"/>
+          </p:cNvPicPr>
+          <p:nvPr>
+            <p:ph idx="1"/>
+          </p:nvPr>
+        </p:nvPicPr>
+        <p:blipFill>
+          <a:blip r:embed="rId3" cstate="print">
+            <a:extLst>
+              <a:ext uri="{28A0092B-C50C-407E-A947-70E740481C1C}">
+                <a14:useLocalDpi xmlns:a14="http://schemas.microsoft.com/office/drawing/2010/main" val="0"/>
+              </a:ext>
+            </a:extLst>
+          </a:blip>
+          <a:stretch>
+            <a:fillRect/>
+          </a:stretch>
+        </p:blipFill>
+        <p:spPr>
+          <a:xfrm>
+            <a:off x="457200" y="2708920"/>
+            <a:ext cx="8229600" cy="1834461"/>
+          </a:xfrm>
+        </p:spPr>
+      </p:pic>
+      <p:sp>
+        <p:nvSpPr>
+          <p:cNvPr id="4" name="Espaço Reservado para Data 3"/>
+          <p:cNvSpPr>
+            <a:spLocks noGrp="1"/>
+          </p:cNvSpPr>
+          <p:nvPr>
+            <p:ph type="dt" sz="half" idx="10"/>
+          </p:nvPr>
+        </p:nvSpPr>
+        <p:spPr/>
+        <p:txBody>
+          <a:bodyPr/>
+          <a:lstStyle/>
+          <a:p>
+            <a:r>
+              <a:rPr lang="pt-BR" smtClean="0"/>
+              <a:t>16 de dezembro de 2013</a:t>
+            </a:r>
+            <a:endParaRPr lang="pt-BR"/>
+          </a:p>
+        </p:txBody>
+      </p:sp>
+      <p:sp>
+        <p:nvSpPr>
+          <p:cNvPr id="5" name="Espaço Reservado para Rodapé 4"/>
+          <p:cNvSpPr>
+            <a:spLocks noGrp="1"/>
+          </p:cNvSpPr>
+          <p:nvPr>
+            <p:ph type="ftr" sz="quarter" idx="11"/>
+          </p:nvPr>
+        </p:nvSpPr>
+        <p:spPr/>
+        <p:txBody>
+          <a:bodyPr/>
+          <a:lstStyle/>
+          <a:p>
+            <a:r>
+              <a:rPr lang="pt-BR" dirty="0" smtClean="0"/>
+              <a:t>Experimento 5</a:t>
+            </a:r>
+          </a:p>
+        </p:txBody>
+      </p:sp>
+      <p:sp>
+        <p:nvSpPr>
+          <p:cNvPr id="6" name="Espaço Reservado para Número de Slide 5"/>
+          <p:cNvSpPr>
+            <a:spLocks noGrp="1"/>
+          </p:cNvSpPr>
+          <p:nvPr>
+            <p:ph type="sldNum" sz="quarter" idx="12"/>
+          </p:nvPr>
+        </p:nvSpPr>
+        <p:spPr/>
+        <p:txBody>
+          <a:bodyPr/>
+          <a:lstStyle/>
+          <a:p>
+            <a:fld id="{E15E65B2-3271-4EB1-B955-03EC741CF5EC}" type="slidenum">
+              <a:rPr lang="pt-BR" smtClean="0"/>
+              <a:t>34</a:t>
+            </a:fld>
+            <a:endParaRPr lang="pt-BR"/>
+          </a:p>
+        </p:txBody>
+      </p:sp>
+    </p:spTree>
+    <p:extLst>
+      <p:ext uri="{BB962C8B-B14F-4D97-AF65-F5344CB8AC3E}">
+        <p14:creationId xmlns:p14="http://schemas.microsoft.com/office/powerpoint/2010/main" val="1197866311"/>
+      </p:ext>
+    </p:extLst>
+  </p:cSld>
+  <p:clrMapOvr>
+    <a:masterClrMapping/>
+  </p:clrMapOvr>
+  <p:timing>
+    <p:tnLst>
+      <p:par>
+        <p:cTn id="1" dur="indefinite" restart="never" nodeType="tmRoot"/>
+      </p:par>
+    </p:tnLst>
+  </p:timing>
+</p:sld>
+</file>
+
+<file path=ppt/slides/slide35.xml><?xml version="1.0" encoding="utf-8"?>
+<p:sld xmlns:a="http://schemas.openxmlformats.org/drawingml/2006/main" xmlns:r="http://schemas.openxmlformats.org/officeDocument/2006/relationships" xmlns:p="http://schemas.openxmlformats.org/presentationml/2006/main">
+  <p:cSld>
+    <p:spTree>
+      <p:nvGrpSpPr>
+        <p:cNvPr id="1" name=""/>
+        <p:cNvGrpSpPr/>
+        <p:nvPr/>
+      </p:nvGrpSpPr>
+      <p:grpSpPr>
+        <a:xfrm>
+          <a:off x="0" y="0"/>
+          <a:ext cx="0" cy="0"/>
+          <a:chOff x="0" y="0"/>
+          <a:chExt cx="0" cy="0"/>
+        </a:xfrm>
+      </p:grpSpPr>
+      <p:sp>
+        <p:nvSpPr>
+          <p:cNvPr id="2" name="Título 1"/>
+          <p:cNvSpPr>
+            <a:spLocks noGrp="1"/>
+          </p:cNvSpPr>
+          <p:nvPr>
+            <p:ph type="title"/>
+          </p:nvPr>
+        </p:nvSpPr>
+        <p:spPr/>
+        <p:txBody>
+          <a:bodyPr/>
+          <a:lstStyle/>
+          <a:p>
+            <a:r>
+              <a:rPr lang="pt-BR" dirty="0" smtClean="0"/>
               <a:t>Resultados</a:t>
             </a:r>
             <a:endParaRPr lang="pt-BR" dirty="0"/>
@@ -13908,7 +14097,7 @@
           <a:p>
             <a:fld id="{E15E65B2-3271-4EB1-B955-03EC741CF5EC}" type="slidenum">
               <a:rPr lang="pt-BR" smtClean="0"/>
-              <a:t>34</a:t>
+              <a:t>35</a:t>
             </a:fld>
             <a:endParaRPr lang="pt-BR"/>
           </a:p>
@@ -13964,150 +14153,6 @@
 </p:sld>
 </file>
 
-<file path=ppt/slides/slide35.xml><?xml version="1.0" encoding="utf-8"?>
-<p:sld xmlns:a="http://schemas.openxmlformats.org/drawingml/2006/main" xmlns:r="http://schemas.openxmlformats.org/officeDocument/2006/relationships" xmlns:p="http://schemas.openxmlformats.org/presentationml/2006/main">
-  <p:cSld>
-    <p:spTree>
-      <p:nvGrpSpPr>
-        <p:cNvPr id="1" name=""/>
-        <p:cNvGrpSpPr/>
-        <p:nvPr/>
-      </p:nvGrpSpPr>
-      <p:grpSpPr>
-        <a:xfrm>
-          <a:off x="0" y="0"/>
-          <a:ext cx="0" cy="0"/>
-          <a:chOff x="0" y="0"/>
-          <a:chExt cx="0" cy="0"/>
-        </a:xfrm>
-      </p:grpSpPr>
-      <p:sp>
-        <p:nvSpPr>
-          <p:cNvPr id="2" name="Título 1"/>
-          <p:cNvSpPr>
-            <a:spLocks noGrp="1"/>
-          </p:cNvSpPr>
-          <p:nvPr>
-            <p:ph type="title"/>
-          </p:nvPr>
-        </p:nvSpPr>
-        <p:spPr/>
-        <p:txBody>
-          <a:bodyPr/>
-          <a:lstStyle/>
-          <a:p>
-            <a:r>
-              <a:rPr lang="pt-BR" dirty="0" smtClean="0"/>
-              <a:t>Resultados Gerais</a:t>
-            </a:r>
-            <a:endParaRPr lang="pt-BR" dirty="0"/>
-          </a:p>
-        </p:txBody>
-      </p:sp>
-      <p:sp>
-        <p:nvSpPr>
-          <p:cNvPr id="7" name="Espaço Reservado para Texto 6"/>
-          <p:cNvSpPr>
-            <a:spLocks noGrp="1"/>
-          </p:cNvSpPr>
-          <p:nvPr>
-            <p:ph type="body" idx="1"/>
-          </p:nvPr>
-        </p:nvSpPr>
-        <p:spPr/>
-        <p:txBody>
-          <a:bodyPr/>
-          <a:lstStyle/>
-          <a:p>
-            <a:endParaRPr lang="pt-BR"/>
-          </a:p>
-        </p:txBody>
-      </p:sp>
-      <p:sp>
-        <p:nvSpPr>
-          <p:cNvPr id="4" name="Espaço Reservado para Data 3"/>
-          <p:cNvSpPr>
-            <a:spLocks noGrp="1"/>
-          </p:cNvSpPr>
-          <p:nvPr>
-            <p:ph type="dt" sz="half" idx="10"/>
-          </p:nvPr>
-        </p:nvSpPr>
-        <p:spPr/>
-        <p:txBody>
-          <a:bodyPr/>
-          <a:lstStyle/>
-          <a:p>
-            <a:r>
-              <a:rPr lang="pt-BR" smtClean="0"/>
-              <a:t>16 de dezembro de 2013</a:t>
-            </a:r>
-            <a:endParaRPr lang="pt-BR"/>
-          </a:p>
-        </p:txBody>
-      </p:sp>
-      <p:sp>
-        <p:nvSpPr>
-          <p:cNvPr id="5" name="Espaço Reservado para Rodapé 4"/>
-          <p:cNvSpPr>
-            <a:spLocks noGrp="1"/>
-          </p:cNvSpPr>
-          <p:nvPr>
-            <p:ph type="ftr" sz="quarter" idx="11"/>
-          </p:nvPr>
-        </p:nvSpPr>
-        <p:spPr/>
-        <p:txBody>
-          <a:bodyPr/>
-          <a:lstStyle/>
-          <a:p>
-            <a:endParaRPr lang="pt-BR"/>
-          </a:p>
-        </p:txBody>
-      </p:sp>
-      <p:sp>
-        <p:nvSpPr>
-          <p:cNvPr id="6" name="Espaço Reservado para Número de Slide 5"/>
-          <p:cNvSpPr>
-            <a:spLocks noGrp="1"/>
-          </p:cNvSpPr>
-          <p:nvPr>
-            <p:ph type="sldNum" sz="quarter" idx="12"/>
-          </p:nvPr>
-        </p:nvSpPr>
-        <p:spPr/>
-        <p:txBody>
-          <a:bodyPr/>
-          <a:lstStyle/>
-          <a:p>
-            <a:fld id="{E15E65B2-3271-4EB1-B955-03EC741CF5EC}" type="slidenum">
-              <a:rPr lang="pt-BR" smtClean="0"/>
-              <a:t>35</a:t>
-            </a:fld>
-            <a:endParaRPr lang="pt-BR"/>
-          </a:p>
-        </p:txBody>
-      </p:sp>
-    </p:spTree>
-    <p:extLst>
-      <p:ext uri="{BB962C8B-B14F-4D97-AF65-F5344CB8AC3E}">
-        <p14:creationId xmlns:p14="http://schemas.microsoft.com/office/powerpoint/2010/main" val="3117479486"/>
-      </p:ext>
-    </p:extLst>
-  </p:cSld>
-  <p:clrMapOvr>
-    <a:masterClrMapping/>
-  </p:clrMapOvr>
-  <p:timing>
-    <p:tnLst>
-      <p:par>
-        <p:cTn id="1" dur="indefinite" restart="never" nodeType="tmRoot"/>
-      </p:par>
-    </p:tnLst>
-  </p:timing>
-</p:sld>
-</file>
-
 <file path=ppt/slides/slide36.xml><?xml version="1.0" encoding="utf-8"?>
 <p:sld xmlns:a="http://schemas.openxmlformats.org/drawingml/2006/main" xmlns:r="http://schemas.openxmlformats.org/officeDocument/2006/relationships" xmlns:p="http://schemas.openxmlformats.org/presentationml/2006/main">
   <p:cSld>
@@ -14142,7 +14187,7 @@
           <a:p>
             <a:r>
               <a:rPr lang="pt-BR" dirty="0" smtClean="0"/>
-              <a:t>Problemas</a:t>
+              <a:t>Resultados Gerais</a:t>
             </a:r>
             <a:endParaRPr lang="pt-BR" dirty="0"/>
           </a:p>
@@ -14150,64 +14195,20 @@
       </p:sp>
       <p:sp>
         <p:nvSpPr>
-          <p:cNvPr id="3" name="Espaço Reservado para Conteúdo 2"/>
-          <p:cNvSpPr>
-            <a:spLocks noGrp="1"/>
-          </p:cNvSpPr>
-          <p:nvPr>
-            <p:ph idx="1"/>
-          </p:nvPr>
-        </p:nvSpPr>
-        <p:spPr/>
-        <p:txBody>
-          <a:bodyPr/>
-          <a:lstStyle/>
-          <a:p>
-            <a:r>
-              <a:rPr lang="pt-BR" dirty="0" smtClean="0"/>
-              <a:t>Análise de </a:t>
-            </a:r>
-            <a:r>
-              <a:rPr lang="pt-BR" i="1" dirty="0"/>
-              <a:t>t</a:t>
-            </a:r>
-            <a:r>
-              <a:rPr lang="pt-BR" i="1" dirty="0" smtClean="0"/>
-              <a:t>iming</a:t>
-            </a:r>
-          </a:p>
-          <a:p>
-            <a:r>
-              <a:rPr lang="pt-BR" dirty="0" smtClean="0"/>
-              <a:t>Quantidade de recursos</a:t>
-            </a:r>
-          </a:p>
-          <a:p>
-            <a:r>
-              <a:rPr lang="pt-BR" dirty="0" smtClean="0"/>
-              <a:t>Alocação da partição</a:t>
-            </a:r>
-          </a:p>
-          <a:p>
-            <a:r>
-              <a:rPr lang="pt-BR" dirty="0" smtClean="0"/>
-              <a:t>Configurações da partição</a:t>
-            </a:r>
-          </a:p>
-          <a:p>
-            <a:r>
-              <a:rPr lang="pt-BR" dirty="0" smtClean="0"/>
-              <a:t>Tamanho da memória local do MicroBlaze</a:t>
-            </a:r>
-          </a:p>
-          <a:p>
-            <a:r>
-              <a:rPr lang="pt-BR" dirty="0" smtClean="0"/>
-              <a:t>Falta de documentação</a:t>
-            </a:r>
-          </a:p>
-          <a:p>
-            <a:endParaRPr lang="pt-BR" dirty="0"/>
+          <p:cNvPr id="7" name="Espaço Reservado para Texto 6"/>
+          <p:cNvSpPr>
+            <a:spLocks noGrp="1"/>
+          </p:cNvSpPr>
+          <p:nvPr>
+            <p:ph type="body" idx="1"/>
+          </p:nvPr>
+        </p:nvSpPr>
+        <p:spPr/>
+        <p:txBody>
+          <a:bodyPr/>
+          <a:lstStyle/>
+          <a:p>
+            <a:endParaRPr lang="pt-BR"/>
           </a:p>
         </p:txBody>
       </p:sp>
@@ -14249,10 +14250,7 @@
           <a:bodyPr/>
           <a:lstStyle/>
           <a:p>
-            <a:r>
-              <a:rPr lang="pt-BR" dirty="0" smtClean="0"/>
-              <a:t>Resultados</a:t>
-            </a:r>
+            <a:endParaRPr lang="pt-BR"/>
           </a:p>
         </p:txBody>
       </p:sp>
@@ -14282,7 +14280,7 @@
     </p:spTree>
     <p:extLst>
       <p:ext uri="{BB962C8B-B14F-4D97-AF65-F5344CB8AC3E}">
-        <p14:creationId xmlns:p14="http://schemas.microsoft.com/office/powerpoint/2010/main" val="179386271"/>
+        <p14:creationId xmlns:p14="http://schemas.microsoft.com/office/powerpoint/2010/main" val="3117479486"/>
       </p:ext>
     </p:extLst>
   </p:cSld>
@@ -14333,41 +14331,90 @@
           <a:p>
             <a:r>
               <a:rPr lang="pt-BR" dirty="0" smtClean="0"/>
-              <a:t>Fluxo de Projeto Final</a:t>
+              <a:t>Problemas</a:t>
             </a:r>
             <a:endParaRPr lang="pt-BR" dirty="0"/>
           </a:p>
         </p:txBody>
       </p:sp>
-      <p:pic>
-        <p:nvPicPr>
-          <p:cNvPr id="7" name="Espaço Reservado para Conteúdo 6"/>
-          <p:cNvPicPr>
-            <a:picLocks noGrp="1" noChangeAspect="1"/>
-          </p:cNvPicPr>
+      <p:sp>
+        <p:nvSpPr>
+          <p:cNvPr id="3" name="Espaço Reservado para Conteúdo 2"/>
+          <p:cNvSpPr>
+            <a:spLocks noGrp="1"/>
+          </p:cNvSpPr>
           <p:nvPr>
             <p:ph idx="1"/>
           </p:nvPr>
-        </p:nvPicPr>
-        <p:blipFill>
-          <a:blip r:embed="rId3" cstate="print">
-            <a:extLst>
-              <a:ext uri="{28A0092B-C50C-407E-A947-70E740481C1C}">
-                <a14:useLocalDpi xmlns:a14="http://schemas.microsoft.com/office/drawing/2010/main" val="0"/>
-              </a:ext>
-            </a:extLst>
-          </a:blip>
-          <a:stretch>
-            <a:fillRect/>
-          </a:stretch>
-        </p:blipFill>
-        <p:spPr>
-          <a:xfrm>
-            <a:off x="1682925" y="1269320"/>
-            <a:ext cx="5778151" cy="5040000"/>
-          </a:xfrm>
-        </p:spPr>
-      </p:pic>
+        </p:nvSpPr>
+        <p:spPr/>
+        <p:txBody>
+          <a:bodyPr/>
+          <a:lstStyle/>
+          <a:p>
+            <a:r>
+              <a:rPr lang="pt-BR" dirty="0" smtClean="0"/>
+              <a:t>Análise de </a:t>
+            </a:r>
+            <a:r>
+              <a:rPr lang="pt-BR" i="1" dirty="0"/>
+              <a:t>t</a:t>
+            </a:r>
+            <a:r>
+              <a:rPr lang="pt-BR" i="1" dirty="0" smtClean="0"/>
+              <a:t>iming</a:t>
+            </a:r>
+          </a:p>
+          <a:p>
+            <a:r>
+              <a:rPr lang="pt-BR" dirty="0" smtClean="0"/>
+              <a:t>Quantidade de recursos</a:t>
+            </a:r>
+          </a:p>
+          <a:p>
+            <a:r>
+              <a:rPr lang="pt-BR" dirty="0" smtClean="0"/>
+              <a:t>Alocação da partição</a:t>
+            </a:r>
+          </a:p>
+          <a:p>
+            <a:r>
+              <a:rPr lang="pt-BR" dirty="0" smtClean="0"/>
+              <a:t>Configurações/Propriedades </a:t>
+            </a:r>
+            <a:r>
+              <a:rPr lang="pt-BR" dirty="0" smtClean="0"/>
+              <a:t>da </a:t>
+            </a:r>
+            <a:r>
+              <a:rPr lang="pt-BR" dirty="0" smtClean="0"/>
+              <a:t>partição</a:t>
+            </a:r>
+          </a:p>
+          <a:p>
+            <a:r>
+              <a:rPr lang="pt-BR" dirty="0" smtClean="0"/>
+              <a:t>Inversão de bits</a:t>
+            </a:r>
+            <a:endParaRPr lang="pt-BR" dirty="0" smtClean="0"/>
+          </a:p>
+          <a:p>
+            <a:r>
+              <a:rPr lang="pt-BR" dirty="0" smtClean="0"/>
+              <a:t>Tamanho da memória local do MicroBlaze</a:t>
+            </a:r>
+          </a:p>
+          <a:p>
+            <a:r>
+              <a:rPr lang="pt-BR" dirty="0" smtClean="0"/>
+              <a:t>Falta de documentação</a:t>
+            </a:r>
+          </a:p>
+          <a:p>
+            <a:endParaRPr lang="pt-BR" dirty="0"/>
+          </a:p>
+        </p:txBody>
+      </p:sp>
       <p:sp>
         <p:nvSpPr>
           <p:cNvPr id="4" name="Espaço Reservado para Data 3"/>
@@ -14410,7 +14457,6 @@
               <a:rPr lang="pt-BR" dirty="0" smtClean="0"/>
               <a:t>Resultados</a:t>
             </a:r>
-            <a:endParaRPr lang="pt-BR" dirty="0"/>
           </a:p>
         </p:txBody>
       </p:sp>
@@ -14440,7 +14486,7 @@
     </p:spTree>
     <p:extLst>
       <p:ext uri="{BB962C8B-B14F-4D97-AF65-F5344CB8AC3E}">
-        <p14:creationId xmlns:p14="http://schemas.microsoft.com/office/powerpoint/2010/main" val="942896521"/>
+        <p14:creationId xmlns:p14="http://schemas.microsoft.com/office/powerpoint/2010/main" val="179386271"/>
       </p:ext>
     </p:extLst>
   </p:cSld>
@@ -14491,21 +14537,73 @@
           <a:p>
             <a:r>
               <a:rPr lang="pt-BR" dirty="0" smtClean="0"/>
-              <a:t>Conclusão</a:t>
+              <a:t>Fluxo de Projeto Final</a:t>
             </a:r>
             <a:endParaRPr lang="pt-BR" dirty="0"/>
           </a:p>
         </p:txBody>
       </p:sp>
-      <p:sp>
-        <p:nvSpPr>
-          <p:cNvPr id="3" name="Espaço Reservado para Conteúdo 2"/>
-          <p:cNvSpPr>
-            <a:spLocks noGrp="1"/>
-          </p:cNvSpPr>
+      <p:pic>
+        <p:nvPicPr>
+          <p:cNvPr id="7" name="Espaço Reservado para Conteúdo 6"/>
+          <p:cNvPicPr>
+            <a:picLocks noGrp="1" noChangeAspect="1"/>
+          </p:cNvPicPr>
           <p:nvPr>
             <p:ph idx="1"/>
           </p:nvPr>
+        </p:nvPicPr>
+        <p:blipFill>
+          <a:blip r:embed="rId3" cstate="print">
+            <a:extLst>
+              <a:ext uri="{28A0092B-C50C-407E-A947-70E740481C1C}">
+                <a14:useLocalDpi xmlns:a14="http://schemas.microsoft.com/office/drawing/2010/main" val="0"/>
+              </a:ext>
+            </a:extLst>
+          </a:blip>
+          <a:stretch>
+            <a:fillRect/>
+          </a:stretch>
+        </p:blipFill>
+        <p:spPr>
+          <a:xfrm>
+            <a:off x="1682925" y="1269320"/>
+            <a:ext cx="5778151" cy="5040000"/>
+          </a:xfrm>
+        </p:spPr>
+      </p:pic>
+      <p:sp>
+        <p:nvSpPr>
+          <p:cNvPr id="4" name="Espaço Reservado para Data 3"/>
+          <p:cNvSpPr>
+            <a:spLocks noGrp="1"/>
+          </p:cNvSpPr>
+          <p:nvPr>
+            <p:ph type="dt" sz="half" idx="10"/>
+          </p:nvPr>
+        </p:nvSpPr>
+        <p:spPr/>
+        <p:txBody>
+          <a:bodyPr/>
+          <a:lstStyle/>
+          <a:p>
+            <a:r>
+              <a:rPr lang="pt-BR" smtClean="0"/>
+              <a:t>16 de dezembro de 2013</a:t>
+            </a:r>
+            <a:endParaRPr lang="pt-BR"/>
+          </a:p>
+        </p:txBody>
+      </p:sp>
+      <p:sp>
+        <p:nvSpPr>
+          <p:cNvPr id="5" name="Espaço Reservado para Rodapé 4"/>
+          <p:cNvSpPr>
+            <a:spLocks noGrp="1"/>
+          </p:cNvSpPr>
+          <p:nvPr>
+            <p:ph type="ftr" sz="quarter" idx="11"/>
+          </p:nvPr>
         </p:nvSpPr>
         <p:spPr/>
         <p:txBody>
@@ -14514,74 +14612,9 @@
           <a:p>
             <a:r>
               <a:rPr lang="pt-BR" dirty="0" smtClean="0"/>
-              <a:t>MicroBlaze</a:t>
-            </a:r>
-          </a:p>
-          <a:p>
-            <a:pPr lvl="1"/>
-            <a:r>
-              <a:rPr lang="pt-BR" dirty="0" smtClean="0"/>
-              <a:t>Memórias</a:t>
-            </a:r>
-          </a:p>
-          <a:p>
-            <a:pPr lvl="1"/>
-            <a:r>
-              <a:rPr lang="pt-BR" dirty="0" smtClean="0"/>
-              <a:t>Periféricos customizados</a:t>
-            </a:r>
-          </a:p>
-          <a:p>
-            <a:r>
-              <a:rPr lang="pt-BR" dirty="0" smtClean="0"/>
-              <a:t>Autorreconfiguração através do MicroBlaze</a:t>
+              <a:t>Resultados</a:t>
             </a:r>
             <a:endParaRPr lang="pt-BR" dirty="0"/>
-          </a:p>
-          <a:p>
-            <a:endParaRPr lang="pt-BR" dirty="0"/>
-          </a:p>
-        </p:txBody>
-      </p:sp>
-      <p:sp>
-        <p:nvSpPr>
-          <p:cNvPr id="4" name="Espaço Reservado para Data 3"/>
-          <p:cNvSpPr>
-            <a:spLocks noGrp="1"/>
-          </p:cNvSpPr>
-          <p:nvPr>
-            <p:ph type="dt" sz="half" idx="10"/>
-          </p:nvPr>
-        </p:nvSpPr>
-        <p:spPr/>
-        <p:txBody>
-          <a:bodyPr/>
-          <a:lstStyle/>
-          <a:p>
-            <a:r>
-              <a:rPr lang="pt-BR" smtClean="0"/>
-              <a:t>16 de dezembro de 2013</a:t>
-            </a:r>
-            <a:endParaRPr lang="pt-BR"/>
-          </a:p>
-        </p:txBody>
-      </p:sp>
-      <p:sp>
-        <p:nvSpPr>
-          <p:cNvPr id="5" name="Espaço Reservado para Rodapé 4"/>
-          <p:cNvSpPr>
-            <a:spLocks noGrp="1"/>
-          </p:cNvSpPr>
-          <p:nvPr>
-            <p:ph type="ftr" sz="quarter" idx="11"/>
-          </p:nvPr>
-        </p:nvSpPr>
-        <p:spPr/>
-        <p:txBody>
-          <a:bodyPr/>
-          <a:lstStyle/>
-          <a:p>
-            <a:endParaRPr lang="pt-BR"/>
           </a:p>
         </p:txBody>
       </p:sp>
@@ -14611,7 +14644,7 @@
     </p:spTree>
     <p:extLst>
       <p:ext uri="{BB962C8B-B14F-4D97-AF65-F5344CB8AC3E}">
-        <p14:creationId xmlns:p14="http://schemas.microsoft.com/office/powerpoint/2010/main" val="356155338"/>
+        <p14:creationId xmlns:p14="http://schemas.microsoft.com/office/powerpoint/2010/main" val="942896521"/>
       </p:ext>
     </p:extLst>
   </p:cSld>
@@ -14662,7 +14695,7 @@
           <a:p>
             <a:r>
               <a:rPr lang="pt-BR" dirty="0" smtClean="0"/>
-              <a:t>Propostas</a:t>
+              <a:t>Conclusão</a:t>
             </a:r>
             <a:endParaRPr lang="pt-BR" dirty="0"/>
           </a:p>
@@ -14685,31 +14718,27 @@
           <a:p>
             <a:r>
               <a:rPr lang="pt-BR" dirty="0" smtClean="0"/>
-              <a:t>Redes Neurais</a:t>
-            </a:r>
-          </a:p>
-          <a:p>
+              <a:t>MicroBlaze</a:t>
+            </a:r>
+          </a:p>
+          <a:p>
+            <a:pPr lvl="1"/>
             <a:r>
               <a:rPr lang="pt-BR" dirty="0" smtClean="0"/>
-              <a:t>Controle Adaptativo*</a:t>
-            </a:r>
-          </a:p>
-          <a:p>
+              <a:t>Memórias</a:t>
+            </a:r>
+          </a:p>
+          <a:p>
+            <a:pPr lvl="1"/>
             <a:r>
               <a:rPr lang="pt-BR" dirty="0" smtClean="0"/>
-              <a:t>Computação Genérica</a:t>
+              <a:t>Periféricos customizados</a:t>
             </a:r>
           </a:p>
           <a:p>
             <a:r>
               <a:rPr lang="pt-BR" dirty="0" smtClean="0"/>
-              <a:t>Qualquer sistema multiplexado</a:t>
-            </a:r>
-          </a:p>
-          <a:p>
-            <a:r>
-              <a:rPr lang="pt-BR" dirty="0" smtClean="0"/>
-              <a:t>Processos realizados em etapas</a:t>
+              <a:t>Autorreconfiguração através do MicroBlaze</a:t>
             </a:r>
             <a:endParaRPr lang="pt-BR" dirty="0"/>
           </a:p>
@@ -14786,13 +14815,20 @@
     </p:spTree>
     <p:extLst>
       <p:ext uri="{BB962C8B-B14F-4D97-AF65-F5344CB8AC3E}">
-        <p14:creationId xmlns:p14="http://schemas.microsoft.com/office/powerpoint/2010/main" val="1442439195"/>
+        <p14:creationId xmlns:p14="http://schemas.microsoft.com/office/powerpoint/2010/main" val="356155338"/>
       </p:ext>
     </p:extLst>
   </p:cSld>
   <p:clrMapOvr>
     <a:masterClrMapping/>
   </p:clrMapOvr>
+  <p:timing>
+    <p:tnLst>
+      <p:par>
+        <p:cTn id="1" dur="indefinite" restart="never" nodeType="tmRoot"/>
+      </p:par>
+    </p:tnLst>
+  </p:timing>
 </p:sld>
 </file>
 
@@ -14951,6 +14987,188 @@
       </p:par>
     </p:tnLst>
   </p:timing>
+</p:sld>
+</file>
+
+<file path=ppt/slides/slide40.xml><?xml version="1.0" encoding="utf-8"?>
+<p:sld xmlns:a="http://schemas.openxmlformats.org/drawingml/2006/main" xmlns:r="http://schemas.openxmlformats.org/officeDocument/2006/relationships" xmlns:p="http://schemas.openxmlformats.org/presentationml/2006/main">
+  <p:cSld>
+    <p:spTree>
+      <p:nvGrpSpPr>
+        <p:cNvPr id="1" name=""/>
+        <p:cNvGrpSpPr/>
+        <p:nvPr/>
+      </p:nvGrpSpPr>
+      <p:grpSpPr>
+        <a:xfrm>
+          <a:off x="0" y="0"/>
+          <a:ext cx="0" cy="0"/>
+          <a:chOff x="0" y="0"/>
+          <a:chExt cx="0" cy="0"/>
+        </a:xfrm>
+      </p:grpSpPr>
+      <p:sp>
+        <p:nvSpPr>
+          <p:cNvPr id="2" name="Título 1"/>
+          <p:cNvSpPr>
+            <a:spLocks noGrp="1"/>
+          </p:cNvSpPr>
+          <p:nvPr>
+            <p:ph type="title"/>
+          </p:nvPr>
+        </p:nvSpPr>
+        <p:spPr/>
+        <p:txBody>
+          <a:bodyPr/>
+          <a:lstStyle/>
+          <a:p>
+            <a:r>
+              <a:rPr lang="pt-BR" dirty="0" smtClean="0"/>
+              <a:t>Propostas</a:t>
+            </a:r>
+            <a:endParaRPr lang="pt-BR" dirty="0"/>
+          </a:p>
+        </p:txBody>
+      </p:sp>
+      <p:sp>
+        <p:nvSpPr>
+          <p:cNvPr id="3" name="Espaço Reservado para Conteúdo 2"/>
+          <p:cNvSpPr>
+            <a:spLocks noGrp="1"/>
+          </p:cNvSpPr>
+          <p:nvPr>
+            <p:ph idx="1"/>
+          </p:nvPr>
+        </p:nvSpPr>
+        <p:spPr/>
+        <p:txBody>
+          <a:bodyPr>
+            <a:normAutofit lnSpcReduction="10000"/>
+          </a:bodyPr>
+          <a:lstStyle/>
+          <a:p>
+            <a:r>
+              <a:rPr lang="pt-BR" dirty="0" smtClean="0"/>
+              <a:t>Redes Neurais</a:t>
+            </a:r>
+          </a:p>
+          <a:p>
+            <a:r>
+              <a:rPr lang="pt-BR" dirty="0" smtClean="0"/>
+              <a:t>Controle Adaptativo*</a:t>
+            </a:r>
+          </a:p>
+          <a:p>
+            <a:r>
+              <a:rPr lang="pt-BR" dirty="0" smtClean="0"/>
+              <a:t>Computação Genérica</a:t>
+            </a:r>
+          </a:p>
+          <a:p>
+            <a:r>
+              <a:rPr lang="pt-BR" dirty="0" smtClean="0"/>
+              <a:t>...</a:t>
+            </a:r>
+          </a:p>
+          <a:p>
+            <a:endParaRPr lang="pt-BR" dirty="0" smtClean="0"/>
+          </a:p>
+          <a:p>
+            <a:endParaRPr lang="pt-BR" dirty="0"/>
+          </a:p>
+          <a:p>
+            <a:r>
+              <a:rPr lang="pt-BR" dirty="0" smtClean="0"/>
+              <a:t>Qualquer sistema multiplexado</a:t>
+            </a:r>
+          </a:p>
+          <a:p>
+            <a:r>
+              <a:rPr lang="pt-BR" dirty="0" smtClean="0"/>
+              <a:t>Processos realizados em etapas</a:t>
+            </a:r>
+            <a:endParaRPr lang="pt-BR" dirty="0"/>
+          </a:p>
+          <a:p>
+            <a:endParaRPr lang="pt-BR" dirty="0"/>
+          </a:p>
+        </p:txBody>
+      </p:sp>
+      <p:sp>
+        <p:nvSpPr>
+          <p:cNvPr id="4" name="Espaço Reservado para Data 3"/>
+          <p:cNvSpPr>
+            <a:spLocks noGrp="1"/>
+          </p:cNvSpPr>
+          <p:nvPr>
+            <p:ph type="dt" sz="half" idx="10"/>
+          </p:nvPr>
+        </p:nvSpPr>
+        <p:spPr/>
+        <p:txBody>
+          <a:bodyPr/>
+          <a:lstStyle/>
+          <a:p>
+            <a:r>
+              <a:rPr lang="pt-BR" smtClean="0"/>
+              <a:t>16 de dezembro de 2013</a:t>
+            </a:r>
+            <a:endParaRPr lang="pt-BR"/>
+          </a:p>
+        </p:txBody>
+      </p:sp>
+      <p:sp>
+        <p:nvSpPr>
+          <p:cNvPr id="5" name="Espaço Reservado para Rodapé 4"/>
+          <p:cNvSpPr>
+            <a:spLocks noGrp="1"/>
+          </p:cNvSpPr>
+          <p:nvPr>
+            <p:ph type="ftr" sz="quarter" idx="11"/>
+          </p:nvPr>
+        </p:nvSpPr>
+        <p:spPr/>
+        <p:txBody>
+          <a:bodyPr/>
+          <a:lstStyle/>
+          <a:p>
+            <a:endParaRPr lang="pt-BR"/>
+          </a:p>
+        </p:txBody>
+      </p:sp>
+      <p:sp>
+        <p:nvSpPr>
+          <p:cNvPr id="6" name="Espaço Reservado para Número de Slide 5"/>
+          <p:cNvSpPr>
+            <a:spLocks noGrp="1"/>
+          </p:cNvSpPr>
+          <p:nvPr>
+            <p:ph type="sldNum" sz="quarter" idx="12"/>
+          </p:nvPr>
+        </p:nvSpPr>
+        <p:spPr/>
+        <p:txBody>
+          <a:bodyPr/>
+          <a:lstStyle/>
+          <a:p>
+            <a:fld id="{E15E65B2-3271-4EB1-B955-03EC741CF5EC}" type="slidenum">
+              <a:rPr lang="pt-BR" smtClean="0"/>
+              <a:t>40</a:t>
+            </a:fld>
+            <a:endParaRPr lang="pt-BR"/>
+          </a:p>
+        </p:txBody>
+      </p:sp>
+    </p:spTree>
+    <p:extLst>
+      <p:ext uri="{BB962C8B-B14F-4D97-AF65-F5344CB8AC3E}">
+        <p14:creationId xmlns:p14="http://schemas.microsoft.com/office/powerpoint/2010/main" val="1442439195"/>
+      </p:ext>
+    </p:extLst>
+  </p:cSld>
+  <p:clrMapOvr>
+    <a:masterClrMapping/>
+  </p:clrMapOvr>
 </p:sld>
 </file>
 

</xml_diff>